<commit_message>
ADSB Presentation Extra Slides
</commit_message>
<xml_diff>
--- a/PHY3147/ADSB_Presentation.pptx
+++ b/PHY3147/ADSB_Presentation.pptx
@@ -5,7 +5,7 @@
     <p:sldMasterId id="2147483648" r:id="rId1"/>
   </p:sldMasterIdLst>
   <p:notesMasterIdLst>
-    <p:notesMasterId r:id="rId13"/>
+    <p:notesMasterId r:id="rId15"/>
   </p:notesMasterIdLst>
   <p:sldIdLst>
     <p:sldId id="256" r:id="rId2"/>
@@ -19,6 +19,8 @@
     <p:sldId id="267" r:id="rId10"/>
     <p:sldId id="268" r:id="rId11"/>
     <p:sldId id="263" r:id="rId12"/>
+    <p:sldId id="271" r:id="rId13"/>
+    <p:sldId id="272" r:id="rId14"/>
   </p:sldIdLst>
   <p:sldSz cx="12192000" cy="6858000"/>
   <p:notesSz cx="6858000" cy="9144000"/>
@@ -133,6 +135,8 @@
             <p14:sldId id="267"/>
             <p14:sldId id="268"/>
             <p14:sldId id="263"/>
+            <p14:sldId id="271"/>
+            <p14:sldId id="272"/>
           </p14:sldIdLst>
         </p14:section>
       </p14:sectionLst>
@@ -237,7 +241,7 @@
           <a:p>
             <a:fld id="{8CDFF4CB-356B-4B38-95B6-292FF56F68A2}" type="datetimeFigureOut">
               <a:rPr lang="en-GB" smtClean="0"/>
-              <a:t>20/10/2019</a:t>
+              <a:t>21/10/2019</a:t>
             </a:fld>
             <a:endParaRPr lang="en-GB"/>
           </a:p>
@@ -720,7 +724,7 @@
           <a:p>
             <a:fld id="{82E3491A-DA20-485D-A3DD-B3B630B308C3}" type="datetimeFigureOut">
               <a:rPr lang="en-GB" smtClean="0"/>
-              <a:t>20/10/2019</a:t>
+              <a:t>21/10/2019</a:t>
             </a:fld>
             <a:endParaRPr lang="en-GB"/>
           </a:p>
@@ -890,7 +894,7 @@
           <a:p>
             <a:fld id="{82E3491A-DA20-485D-A3DD-B3B630B308C3}" type="datetimeFigureOut">
               <a:rPr lang="en-GB" smtClean="0"/>
-              <a:t>20/10/2019</a:t>
+              <a:t>21/10/2019</a:t>
             </a:fld>
             <a:endParaRPr lang="en-GB"/>
           </a:p>
@@ -1070,7 +1074,7 @@
           <a:p>
             <a:fld id="{82E3491A-DA20-485D-A3DD-B3B630B308C3}" type="datetimeFigureOut">
               <a:rPr lang="en-GB" smtClean="0"/>
-              <a:t>20/10/2019</a:t>
+              <a:t>21/10/2019</a:t>
             </a:fld>
             <a:endParaRPr lang="en-GB"/>
           </a:p>
@@ -1240,7 +1244,7 @@
           <a:p>
             <a:fld id="{82E3491A-DA20-485D-A3DD-B3B630B308C3}" type="datetimeFigureOut">
               <a:rPr lang="en-GB" smtClean="0"/>
-              <a:t>20/10/2019</a:t>
+              <a:t>21/10/2019</a:t>
             </a:fld>
             <a:endParaRPr lang="en-GB"/>
           </a:p>
@@ -1486,7 +1490,7 @@
           <a:p>
             <a:fld id="{82E3491A-DA20-485D-A3DD-B3B630B308C3}" type="datetimeFigureOut">
               <a:rPr lang="en-GB" smtClean="0"/>
-              <a:t>20/10/2019</a:t>
+              <a:t>21/10/2019</a:t>
             </a:fld>
             <a:endParaRPr lang="en-GB"/>
           </a:p>
@@ -1718,7 +1722,7 @@
           <a:p>
             <a:fld id="{82E3491A-DA20-485D-A3DD-B3B630B308C3}" type="datetimeFigureOut">
               <a:rPr lang="en-GB" smtClean="0"/>
-              <a:t>20/10/2019</a:t>
+              <a:t>21/10/2019</a:t>
             </a:fld>
             <a:endParaRPr lang="en-GB"/>
           </a:p>
@@ -2085,7 +2089,7 @@
           <a:p>
             <a:fld id="{82E3491A-DA20-485D-A3DD-B3B630B308C3}" type="datetimeFigureOut">
               <a:rPr lang="en-GB" smtClean="0"/>
-              <a:t>20/10/2019</a:t>
+              <a:t>21/10/2019</a:t>
             </a:fld>
             <a:endParaRPr lang="en-GB"/>
           </a:p>
@@ -2203,7 +2207,7 @@
           <a:p>
             <a:fld id="{82E3491A-DA20-485D-A3DD-B3B630B308C3}" type="datetimeFigureOut">
               <a:rPr lang="en-GB" smtClean="0"/>
-              <a:t>20/10/2019</a:t>
+              <a:t>21/10/2019</a:t>
             </a:fld>
             <a:endParaRPr lang="en-GB"/>
           </a:p>
@@ -2298,7 +2302,7 @@
           <a:p>
             <a:fld id="{82E3491A-DA20-485D-A3DD-B3B630B308C3}" type="datetimeFigureOut">
               <a:rPr lang="en-GB" smtClean="0"/>
-              <a:t>20/10/2019</a:t>
+              <a:t>21/10/2019</a:t>
             </a:fld>
             <a:endParaRPr lang="en-GB"/>
           </a:p>
@@ -2575,7 +2579,7 @@
           <a:p>
             <a:fld id="{82E3491A-DA20-485D-A3DD-B3B630B308C3}" type="datetimeFigureOut">
               <a:rPr lang="en-GB" smtClean="0"/>
-              <a:t>20/10/2019</a:t>
+              <a:t>21/10/2019</a:t>
             </a:fld>
             <a:endParaRPr lang="en-GB"/>
           </a:p>
@@ -2828,7 +2832,7 @@
           <a:p>
             <a:fld id="{82E3491A-DA20-485D-A3DD-B3B630B308C3}" type="datetimeFigureOut">
               <a:rPr lang="en-GB" smtClean="0"/>
-              <a:t>20/10/2019</a:t>
+              <a:t>21/10/2019</a:t>
             </a:fld>
             <a:endParaRPr lang="en-GB"/>
           </a:p>
@@ -3065,7 +3069,7 @@
           <a:p>
             <a:fld id="{82E3491A-DA20-485D-A3DD-B3B630B308C3}" type="datetimeFigureOut">
               <a:rPr lang="en-GB" smtClean="0"/>
-              <a:t>20/10/2019</a:t>
+              <a:t>21/10/2019</a:t>
             </a:fld>
             <a:endParaRPr lang="en-GB"/>
           </a:p>
@@ -4055,7 +4059,7 @@
                 <a:latin typeface="Times New Roman" panose="02020603050405020304" pitchFamily="18" charset="0"/>
                 <a:cs typeface="Times New Roman" panose="02020603050405020304" pitchFamily="18" charset="0"/>
               </a:rPr>
-              <a:t>ADSB - Extended</a:t>
+              <a:t>ADSB – Extended</a:t>
             </a:r>
             <a:endParaRPr lang="en-GB" sz="4800" dirty="0">
               <a:latin typeface="Times New Roman" panose="02020603050405020304" pitchFamily="18" charset="0"/>
@@ -4314,8 +4318,8 @@
               </a:p>
               <a:p>
                 <a:pPr algn="ctr">
-                  <a:buFont typeface="Wingdings" panose="05000000000000000000" pitchFamily="2" charset="2"/>
-                  <a:buChar char="Ø"/>
+                  <a:buFont typeface="Times New Roman" panose="02020603050405020304" pitchFamily="18" charset="0"/>
+                  <a:buChar char="-"/>
                 </a:pPr>
                 <a:r>
                   <a:rPr lang="en-GB" sz="2400" dirty="0" smtClean="0">
@@ -4327,8 +4331,8 @@
               </a:p>
               <a:p>
                 <a:pPr algn="ctr">
-                  <a:buFont typeface="Wingdings" panose="05000000000000000000" pitchFamily="2" charset="2"/>
-                  <a:buChar char="Ø"/>
+                  <a:buFont typeface="Times New Roman" panose="02020603050405020304" pitchFamily="18" charset="0"/>
+                  <a:buChar char="-"/>
                 </a:pPr>
                 <a:r>
                   <a:rPr lang="en-GB" sz="2400" dirty="0" smtClean="0">
@@ -4340,11 +4344,11 @@
               </a:p>
               <a:p>
                 <a:pPr algn="ctr">
-                  <a:buFont typeface="Wingdings" panose="05000000000000000000" pitchFamily="2" charset="2"/>
-                  <a:buChar char="Ø"/>
+                  <a:buFont typeface="Times New Roman" panose="02020603050405020304" pitchFamily="18" charset="0"/>
+                  <a:buChar char="-"/>
                 </a:pPr>
                 <a:r>
-                  <a:rPr lang="en-GB" sz="2400" dirty="0" smtClean="0">
+                  <a:rPr lang="en-GB" sz="2400" dirty="0">
                     <a:latin typeface="Times New Roman" panose="02020603050405020304" pitchFamily="18" charset="0"/>
                     <a:cs typeface="Times New Roman" panose="02020603050405020304" pitchFamily="18" charset="0"/>
                   </a:rPr>
@@ -4353,11 +4357,11 @@
               </a:p>
               <a:p>
                 <a:pPr algn="ctr">
-                  <a:buFont typeface="Wingdings" panose="05000000000000000000" pitchFamily="2" charset="2"/>
-                  <a:buChar char="Ø"/>
+                  <a:buFont typeface="Times New Roman" panose="02020603050405020304" pitchFamily="18" charset="0"/>
+                  <a:buChar char="-"/>
                 </a:pPr>
                 <a:r>
-                  <a:rPr lang="en-GB" sz="2400" dirty="0" smtClean="0">
+                  <a:rPr lang="en-GB" sz="2400" dirty="0">
                     <a:latin typeface="Times New Roman" panose="02020603050405020304" pitchFamily="18" charset="0"/>
                     <a:cs typeface="Times New Roman" panose="02020603050405020304" pitchFamily="18" charset="0"/>
                   </a:rPr>
@@ -4366,20 +4370,32 @@
               </a:p>
               <a:p>
                 <a:pPr algn="ctr">
-                  <a:buFont typeface="Wingdings" panose="05000000000000000000" pitchFamily="2" charset="2"/>
-                  <a:buChar char="Ø"/>
+                  <a:buFont typeface="Times New Roman" panose="02020603050405020304" pitchFamily="18" charset="0"/>
+                  <a:buChar char="-"/>
                 </a:pPr>
+                <a:r>
+                  <a:rPr lang="en-GB" sz="2400" dirty="0">
+                    <a:latin typeface="Times New Roman" panose="02020603050405020304" pitchFamily="18" charset="0"/>
+                    <a:cs typeface="Times New Roman" panose="02020603050405020304" pitchFamily="18" charset="0"/>
+                  </a:rPr>
+                  <a:t>24 bit parity check (to check if message has been received without error</a:t>
+                </a:r>
                 <a:r>
                   <a:rPr lang="en-GB" sz="2400" dirty="0" smtClean="0">
                     <a:latin typeface="Times New Roman" panose="02020603050405020304" pitchFamily="18" charset="0"/>
                     <a:cs typeface="Times New Roman" panose="02020603050405020304" pitchFamily="18" charset="0"/>
                   </a:rPr>
-                  <a:t>24 bit parity check (to check if message has been received without error)</a:t>
+                  <a:t>)</a:t>
                 </a:r>
+                <a:endParaRPr lang="en-GB" sz="2400" dirty="0">
+                  <a:latin typeface="Times New Roman" panose="02020603050405020304" pitchFamily="18" charset="0"/>
+                  <a:cs typeface="Times New Roman" panose="02020603050405020304" pitchFamily="18" charset="0"/>
+                </a:endParaRPr>
               </a:p>
               <a:p>
-                <a:pPr marL="0" indent="0" algn="ctr">
-                  <a:buNone/>
+                <a:pPr algn="ctr">
+                  <a:buFont typeface="Times New Roman" panose="02020603050405020304" pitchFamily="18" charset="0"/>
+                  <a:buChar char="-"/>
                 </a:pPr>
                 <a:endParaRPr lang="en-GB" sz="2400" dirty="0" smtClean="0">
                   <a:latin typeface="Times New Roman" panose="02020603050405020304" pitchFamily="18" charset="0"/>
@@ -5068,6 +5084,2518 @@
       <p:bldP spid="7" grpId="0"/>
       <p:bldP spid="16" grpId="0" build="allAtOnce"/>
       <p:bldP spid="17" grpId="0"/>
+    </p:bldLst>
+  </p:timing>
+</p:sld>
+</file>
+
+<file path=ppt/slides/slide12.xml><?xml version="1.0" encoding="utf-8"?>
+<p:sld xmlns:a="http://schemas.openxmlformats.org/drawingml/2006/main" xmlns:r="http://schemas.openxmlformats.org/officeDocument/2006/relationships" xmlns:p="http://schemas.openxmlformats.org/presentationml/2006/main">
+  <p:cSld>
+    <p:spTree>
+      <p:nvGrpSpPr>
+        <p:cNvPr id="1" name=""/>
+        <p:cNvGrpSpPr/>
+        <p:nvPr/>
+      </p:nvGrpSpPr>
+      <p:grpSpPr>
+        <a:xfrm>
+          <a:off x="0" y="0"/>
+          <a:ext cx="0" cy="0"/>
+          <a:chOff x="0" y="0"/>
+          <a:chExt cx="0" cy="0"/>
+        </a:xfrm>
+      </p:grpSpPr>
+      <p:sp>
+        <p:nvSpPr>
+          <p:cNvPr id="4" name="Title 1"/>
+          <p:cNvSpPr txBox="1">
+            <a:spLocks noGrp="1"/>
+          </p:cNvSpPr>
+          <p:nvPr>
+            <p:ph type="title"/>
+          </p:nvPr>
+        </p:nvSpPr>
+        <p:spPr>
+          <a:xfrm>
+            <a:off x="838200" y="107087"/>
+            <a:ext cx="10515600" cy="757149"/>
+          </a:xfrm>
+          <a:prstGeom prst="rect">
+            <a:avLst/>
+          </a:prstGeom>
+        </p:spPr>
+        <p:txBody>
+          <a:bodyPr vert="horz" lIns="91440" tIns="45720" rIns="91440" bIns="45720" rtlCol="0" anchor="b">
+            <a:normAutofit/>
+          </a:bodyPr>
+          <a:lstStyle>
+            <a:lvl1pPr algn="ctr" defTabSz="914400" rtl="0" eaLnBrk="1" latinLnBrk="0" hangingPunct="1">
+              <a:lnSpc>
+                <a:spcPct val="90000"/>
+              </a:lnSpc>
+              <a:spcBef>
+                <a:spcPct val="0"/>
+              </a:spcBef>
+              <a:buNone/>
+              <a:defRPr sz="6000" kern="1200">
+                <a:solidFill>
+                  <a:schemeClr val="tx1"/>
+                </a:solidFill>
+                <a:latin typeface="+mj-lt"/>
+                <a:ea typeface="+mj-ea"/>
+                <a:cs typeface="+mj-cs"/>
+              </a:defRPr>
+            </a:lvl1pPr>
+          </a:lstStyle>
+          <a:p>
+            <a:r>
+              <a:rPr lang="en-GB" sz="4800" dirty="0" smtClean="0">
+                <a:latin typeface="Times New Roman" panose="02020603050405020304" pitchFamily="18" charset="0"/>
+                <a:cs typeface="Times New Roman" panose="02020603050405020304" pitchFamily="18" charset="0"/>
+              </a:rPr>
+              <a:t>Refraction – Extended</a:t>
+            </a:r>
+            <a:endParaRPr lang="en-GB" sz="4800" dirty="0">
+              <a:latin typeface="Times New Roman" panose="02020603050405020304" pitchFamily="18" charset="0"/>
+              <a:cs typeface="Times New Roman" panose="02020603050405020304" pitchFamily="18" charset="0"/>
+            </a:endParaRPr>
+          </a:p>
+        </p:txBody>
+      </p:sp>
+      <mc:AlternateContent xmlns:mc="http://schemas.openxmlformats.org/markup-compatibility/2006">
+        <mc:Choice xmlns:a14="http://schemas.microsoft.com/office/drawing/2010/main" Requires="a14">
+          <p:sp>
+            <p:nvSpPr>
+              <p:cNvPr id="5" name="Content Placeholder 2"/>
+              <p:cNvSpPr>
+                <a:spLocks noGrp="1"/>
+              </p:cNvSpPr>
+              <p:nvPr>
+                <p:ph idx="1"/>
+              </p:nvPr>
+            </p:nvSpPr>
+            <p:spPr>
+              <a:xfrm>
+                <a:off x="195649" y="1160803"/>
+                <a:ext cx="8149282" cy="5016160"/>
+              </a:xfrm>
+            </p:spPr>
+            <p:txBody>
+              <a:bodyPr>
+                <a:noAutofit/>
+              </a:bodyPr>
+              <a:lstStyle/>
+              <a:p>
+                <a:pPr algn="ctr"/>
+                <a:r>
+                  <a:rPr lang="en-GB" sz="1600" dirty="0" smtClean="0">
+                    <a:latin typeface="Times New Roman" panose="02020603050405020304" pitchFamily="18" charset="0"/>
+                    <a:cs typeface="Times New Roman" panose="02020603050405020304" pitchFamily="18" charset="0"/>
+                  </a:rPr>
+                  <a:t>Refractivity defined as, </a:t>
+                </a:r>
+              </a:p>
+              <a:p>
+                <a:pPr marL="0" indent="0" algn="ctr">
+                  <a:buNone/>
+                </a:pPr>
+                <a14:m>
+                  <m:oMathPara xmlns:m="http://schemas.openxmlformats.org/officeDocument/2006/math">
+                    <m:oMathParaPr>
+                      <m:jc m:val="centerGroup"/>
+                    </m:oMathParaPr>
+                    <m:oMath xmlns:m="http://schemas.openxmlformats.org/officeDocument/2006/math">
+                      <m:r>
+                        <m:rPr>
+                          <m:sty m:val="p"/>
+                        </m:rPr>
+                        <a:rPr lang="en-GB" sz="1600" b="0" i="0" smtClean="0">
+                          <a:latin typeface="Cambria Math" panose="02040503050406030204" pitchFamily="18" charset="0"/>
+                          <a:cs typeface="Times New Roman" panose="02020603050405020304" pitchFamily="18" charset="0"/>
+                        </a:rPr>
+                        <m:t>N</m:t>
+                      </m:r>
+                      <m:r>
+                        <a:rPr lang="en-GB" sz="1600" b="0" i="0" smtClean="0">
+                          <a:latin typeface="Cambria Math" panose="02040503050406030204" pitchFamily="18" charset="0"/>
+                          <a:cs typeface="Times New Roman" panose="02020603050405020304" pitchFamily="18" charset="0"/>
+                        </a:rPr>
+                        <m:t>=</m:t>
+                      </m:r>
+                      <m:d>
+                        <m:dPr>
+                          <m:ctrlPr>
+                            <a:rPr lang="en-GB" sz="1600" b="0" i="1" smtClean="0">
+                              <a:latin typeface="Cambria Math" panose="02040503050406030204" pitchFamily="18" charset="0"/>
+                              <a:cs typeface="Times New Roman" panose="02020603050405020304" pitchFamily="18" charset="0"/>
+                            </a:rPr>
+                          </m:ctrlPr>
+                        </m:dPr>
+                        <m:e>
+                          <m:r>
+                            <m:rPr>
+                              <m:sty m:val="p"/>
+                            </m:rPr>
+                            <a:rPr lang="en-GB" sz="1600" b="0" i="0" smtClean="0">
+                              <a:latin typeface="Cambria Math" panose="02040503050406030204" pitchFamily="18" charset="0"/>
+                              <a:cs typeface="Times New Roman" panose="02020603050405020304" pitchFamily="18" charset="0"/>
+                            </a:rPr>
+                            <m:t>n</m:t>
+                          </m:r>
+                          <m:r>
+                            <a:rPr lang="en-GB" sz="1600" b="0" i="0" smtClean="0">
+                              <a:latin typeface="Cambria Math" panose="02040503050406030204" pitchFamily="18" charset="0"/>
+                              <a:cs typeface="Times New Roman" panose="02020603050405020304" pitchFamily="18" charset="0"/>
+                            </a:rPr>
+                            <m:t> −1</m:t>
+                          </m:r>
+                        </m:e>
+                      </m:d>
+                      <m:sSup>
+                        <m:sSupPr>
+                          <m:ctrlPr>
+                            <a:rPr lang="en-GB" sz="1600" b="0" i="1" smtClean="0">
+                              <a:latin typeface="Cambria Math" panose="02040503050406030204" pitchFamily="18" charset="0"/>
+                              <a:cs typeface="Times New Roman" panose="02020603050405020304" pitchFamily="18" charset="0"/>
+                            </a:rPr>
+                          </m:ctrlPr>
+                        </m:sSupPr>
+                        <m:e>
+                          <m:r>
+                            <a:rPr lang="en-GB" sz="1600" b="0" i="0" smtClean="0">
+                              <a:latin typeface="Cambria Math" panose="02040503050406030204" pitchFamily="18" charset="0"/>
+                              <a:cs typeface="Times New Roman" panose="02020603050405020304" pitchFamily="18" charset="0"/>
+                            </a:rPr>
+                            <m:t> </m:t>
+                          </m:r>
+                          <m:r>
+                            <a:rPr lang="en-GB" sz="1600" b="0" i="1" smtClean="0">
+                              <a:latin typeface="Cambria Math" panose="02040503050406030204" pitchFamily="18" charset="0"/>
+                              <a:ea typeface="Cambria Math" panose="02040503050406030204" pitchFamily="18" charset="0"/>
+                              <a:cs typeface="Times New Roman" panose="02020603050405020304" pitchFamily="18" charset="0"/>
+                            </a:rPr>
+                            <m:t>×</m:t>
+                          </m:r>
+                          <m:r>
+                            <a:rPr lang="en-GB" sz="1600" b="0" i="0" smtClean="0">
+                              <a:latin typeface="Cambria Math" panose="02040503050406030204" pitchFamily="18" charset="0"/>
+                              <a:cs typeface="Times New Roman" panose="02020603050405020304" pitchFamily="18" charset="0"/>
+                            </a:rPr>
+                            <m:t>10</m:t>
+                          </m:r>
+                        </m:e>
+                        <m:sup>
+                          <m:r>
+                            <a:rPr lang="en-GB" sz="1600" b="0" i="0" smtClean="0">
+                              <a:latin typeface="Cambria Math" panose="02040503050406030204" pitchFamily="18" charset="0"/>
+                              <a:cs typeface="Times New Roman" panose="02020603050405020304" pitchFamily="18" charset="0"/>
+                            </a:rPr>
+                            <m:t>6</m:t>
+                          </m:r>
+                        </m:sup>
+                      </m:sSup>
+                    </m:oMath>
+                  </m:oMathPara>
+                </a14:m>
+                <a:endParaRPr lang="en-GB" sz="1600" b="0" dirty="0" smtClean="0">
+                  <a:latin typeface="Cambria Math" panose="02040503050406030204" pitchFamily="18" charset="0"/>
+                  <a:cs typeface="Times New Roman" panose="02020603050405020304" pitchFamily="18" charset="0"/>
+                </a:endParaRPr>
+              </a:p>
+              <a:p>
+                <a:pPr algn="ctr"/>
+                <a:endParaRPr lang="en-GB" sz="1600" b="0" i="1" dirty="0" smtClean="0">
+                  <a:latin typeface="Cambria Math" panose="02040503050406030204" pitchFamily="18" charset="0"/>
+                  <a:cs typeface="Times New Roman" panose="02020603050405020304" pitchFamily="18" charset="0"/>
+                </a:endParaRPr>
+              </a:p>
+              <a:p>
+                <a:pPr algn="ctr"/>
+                <a:r>
+                  <a:rPr lang="en-GB" sz="1600" dirty="0" smtClean="0">
+                    <a:latin typeface="Times New Roman" panose="02020603050405020304" pitchFamily="18" charset="0"/>
+                    <a:cs typeface="Times New Roman" panose="02020603050405020304" pitchFamily="18" charset="0"/>
+                  </a:rPr>
+                  <a:t>Can be split into dry and wet components</a:t>
+                </a:r>
+                <a:r>
+                  <a:rPr lang="en-GB" sz="1600" baseline="30000" dirty="0" smtClean="0">
+                    <a:latin typeface="Times New Roman" panose="02020603050405020304" pitchFamily="18" charset="0"/>
+                    <a:cs typeface="Times New Roman" panose="02020603050405020304" pitchFamily="18" charset="0"/>
+                  </a:rPr>
+                  <a:t>1</a:t>
+                </a:r>
+                <a:r>
+                  <a:rPr lang="en-GB" sz="1600" dirty="0">
+                    <a:latin typeface="Times New Roman" panose="02020603050405020304" pitchFamily="18" charset="0"/>
+                    <a:cs typeface="Times New Roman" panose="02020603050405020304" pitchFamily="18" charset="0"/>
+                  </a:rPr>
+                  <a:t>,</a:t>
+                </a:r>
+                <a:r>
+                  <a:rPr lang="en-GB" sz="1600" dirty="0" smtClean="0">
+                    <a:latin typeface="Times New Roman" panose="02020603050405020304" pitchFamily="18" charset="0"/>
+                    <a:cs typeface="Times New Roman" panose="02020603050405020304" pitchFamily="18" charset="0"/>
+                  </a:rPr>
+                  <a:t> </a:t>
+                </a:r>
+              </a:p>
+              <a:p>
+                <a:pPr marL="0" indent="0" algn="ctr">
+                  <a:buNone/>
+                </a:pPr>
+                <a14:m>
+                  <m:oMath xmlns:m="http://schemas.openxmlformats.org/officeDocument/2006/math">
+                    <m:r>
+                      <m:rPr>
+                        <m:sty m:val="p"/>
+                      </m:rPr>
+                      <a:rPr lang="en-GB" sz="1600" b="0" i="0" dirty="0" smtClean="0">
+                        <a:latin typeface="Cambria Math" panose="02040503050406030204" pitchFamily="18" charset="0"/>
+                        <a:cs typeface="Times New Roman" panose="02020603050405020304" pitchFamily="18" charset="0"/>
+                      </a:rPr>
+                      <m:t>N</m:t>
+                    </m:r>
+                    <m:r>
+                      <a:rPr lang="en-GB" sz="1600" b="0" i="0" dirty="0" smtClean="0">
+                        <a:latin typeface="Cambria Math" panose="02040503050406030204" pitchFamily="18" charset="0"/>
+                        <a:cs typeface="Times New Roman" panose="02020603050405020304" pitchFamily="18" charset="0"/>
+                      </a:rPr>
+                      <m:t>=77.6</m:t>
+                    </m:r>
+                    <m:f>
+                      <m:fPr>
+                        <m:ctrlPr>
+                          <a:rPr lang="en-GB" sz="1600" b="0" i="1" dirty="0" smtClean="0">
+                            <a:latin typeface="Cambria Math" panose="02040503050406030204" pitchFamily="18" charset="0"/>
+                            <a:cs typeface="Times New Roman" panose="02020603050405020304" pitchFamily="18" charset="0"/>
+                          </a:rPr>
+                        </m:ctrlPr>
+                      </m:fPr>
+                      <m:num>
+                        <m:r>
+                          <m:rPr>
+                            <m:sty m:val="p"/>
+                          </m:rPr>
+                          <a:rPr lang="en-GB" sz="1600" b="0" i="0" dirty="0" smtClean="0">
+                            <a:latin typeface="Cambria Math" panose="02040503050406030204" pitchFamily="18" charset="0"/>
+                            <a:cs typeface="Times New Roman" panose="02020603050405020304" pitchFamily="18" charset="0"/>
+                          </a:rPr>
+                          <m:t>P</m:t>
+                        </m:r>
+                      </m:num>
+                      <m:den>
+                        <m:r>
+                          <m:rPr>
+                            <m:sty m:val="p"/>
+                          </m:rPr>
+                          <a:rPr lang="en-GB" sz="1600" b="0" i="0" dirty="0" smtClean="0">
+                            <a:latin typeface="Cambria Math" panose="02040503050406030204" pitchFamily="18" charset="0"/>
+                            <a:cs typeface="Times New Roman" panose="02020603050405020304" pitchFamily="18" charset="0"/>
+                          </a:rPr>
+                          <m:t>T</m:t>
+                        </m:r>
+                      </m:den>
+                    </m:f>
+                    <m:r>
+                      <a:rPr lang="en-GB" sz="1600" b="0" i="0" dirty="0" smtClean="0">
+                        <a:latin typeface="Cambria Math" panose="02040503050406030204" pitchFamily="18" charset="0"/>
+                        <a:cs typeface="Times New Roman" panose="02020603050405020304" pitchFamily="18" charset="0"/>
+                      </a:rPr>
+                      <m:t> −5.6</m:t>
+                    </m:r>
+                    <m:f>
+                      <m:fPr>
+                        <m:ctrlPr>
+                          <a:rPr lang="en-GB" sz="1600" b="0" i="1" dirty="0" smtClean="0">
+                            <a:latin typeface="Cambria Math" panose="02040503050406030204" pitchFamily="18" charset="0"/>
+                            <a:cs typeface="Times New Roman" panose="02020603050405020304" pitchFamily="18" charset="0"/>
+                          </a:rPr>
+                        </m:ctrlPr>
+                      </m:fPr>
+                      <m:num>
+                        <m:sSub>
+                          <m:sSubPr>
+                            <m:ctrlPr>
+                              <a:rPr lang="en-GB" sz="1600" b="0" i="1" dirty="0" smtClean="0">
+                                <a:latin typeface="Cambria Math" panose="02040503050406030204" pitchFamily="18" charset="0"/>
+                                <a:cs typeface="Times New Roman" panose="02020603050405020304" pitchFamily="18" charset="0"/>
+                              </a:rPr>
+                            </m:ctrlPr>
+                          </m:sSubPr>
+                          <m:e>
+                            <m:r>
+                              <m:rPr>
+                                <m:sty m:val="p"/>
+                              </m:rPr>
+                              <a:rPr lang="en-GB" sz="1600" b="0" i="0" dirty="0" smtClean="0">
+                                <a:latin typeface="Cambria Math" panose="02040503050406030204" pitchFamily="18" charset="0"/>
+                                <a:cs typeface="Times New Roman" panose="02020603050405020304" pitchFamily="18" charset="0"/>
+                              </a:rPr>
+                              <m:t>P</m:t>
+                            </m:r>
+                          </m:e>
+                          <m:sub>
+                            <m:r>
+                              <m:rPr>
+                                <m:sty m:val="p"/>
+                              </m:rPr>
+                              <a:rPr lang="en-GB" sz="1600" b="0" i="0" dirty="0" smtClean="0">
+                                <a:latin typeface="Cambria Math" panose="02040503050406030204" pitchFamily="18" charset="0"/>
+                                <a:cs typeface="Times New Roman" panose="02020603050405020304" pitchFamily="18" charset="0"/>
+                              </a:rPr>
+                              <m:t>w</m:t>
+                            </m:r>
+                          </m:sub>
+                        </m:sSub>
+                      </m:num>
+                      <m:den>
+                        <m:r>
+                          <m:rPr>
+                            <m:sty m:val="p"/>
+                          </m:rPr>
+                          <a:rPr lang="en-GB" sz="1600" b="0" i="0" dirty="0" smtClean="0">
+                            <a:latin typeface="Cambria Math" panose="02040503050406030204" pitchFamily="18" charset="0"/>
+                            <a:cs typeface="Times New Roman" panose="02020603050405020304" pitchFamily="18" charset="0"/>
+                          </a:rPr>
+                          <m:t>T</m:t>
+                        </m:r>
+                      </m:den>
+                    </m:f>
+                  </m:oMath>
+                </a14:m>
+                <a:r>
+                  <a:rPr lang="en-GB" sz="1600" dirty="0" smtClean="0">
+                    <a:latin typeface="Times New Roman" panose="02020603050405020304" pitchFamily="18" charset="0"/>
+                    <a:cs typeface="Times New Roman" panose="02020603050405020304" pitchFamily="18" charset="0"/>
+                  </a:rPr>
+                  <a:t> </a:t>
+                </a:r>
+                <a14:m>
+                  <m:oMath xmlns:m="http://schemas.openxmlformats.org/officeDocument/2006/math">
+                    <m:r>
+                      <a:rPr lang="en-GB" sz="1600" b="0" i="0" smtClean="0">
+                        <a:latin typeface="Cambria Math" panose="02040503050406030204" pitchFamily="18" charset="0"/>
+                        <a:cs typeface="Times New Roman" panose="02020603050405020304" pitchFamily="18" charset="0"/>
+                      </a:rPr>
+                      <m:t>+(</m:t>
+                    </m:r>
+                    <m:r>
+                      <a:rPr lang="en-GB" sz="1600" i="0">
+                        <a:latin typeface="Cambria Math" panose="02040503050406030204" pitchFamily="18" charset="0"/>
+                        <a:cs typeface="Times New Roman" panose="02020603050405020304" pitchFamily="18" charset="0"/>
+                      </a:rPr>
+                      <m:t>3.75</m:t>
+                    </m:r>
+                    <m:r>
+                      <a:rPr lang="en-GB" sz="1600" i="1">
+                        <a:latin typeface="Cambria Math" panose="02040503050406030204" pitchFamily="18" charset="0"/>
+                        <a:ea typeface="Cambria Math" panose="02040503050406030204" pitchFamily="18" charset="0"/>
+                        <a:cs typeface="Times New Roman" panose="02020603050405020304" pitchFamily="18" charset="0"/>
+                      </a:rPr>
+                      <m:t>×</m:t>
+                    </m:r>
+                    <m:sSup>
+                      <m:sSupPr>
+                        <m:ctrlPr>
+                          <a:rPr lang="en-GB" sz="1600" i="1">
+                            <a:latin typeface="Cambria Math" panose="02040503050406030204" pitchFamily="18" charset="0"/>
+                            <a:cs typeface="Times New Roman" panose="02020603050405020304" pitchFamily="18" charset="0"/>
+                          </a:rPr>
+                        </m:ctrlPr>
+                      </m:sSupPr>
+                      <m:e>
+                        <m:r>
+                          <a:rPr lang="en-GB" sz="1600" i="0">
+                            <a:latin typeface="Cambria Math" panose="02040503050406030204" pitchFamily="18" charset="0"/>
+                            <a:cs typeface="Times New Roman" panose="02020603050405020304" pitchFamily="18" charset="0"/>
+                          </a:rPr>
+                          <m:t>10</m:t>
+                        </m:r>
+                      </m:e>
+                      <m:sup>
+                        <m:r>
+                          <a:rPr lang="en-GB" sz="1600" i="0">
+                            <a:latin typeface="Cambria Math" panose="02040503050406030204" pitchFamily="18" charset="0"/>
+                            <a:cs typeface="Times New Roman" panose="02020603050405020304" pitchFamily="18" charset="0"/>
+                          </a:rPr>
+                          <m:t>5</m:t>
+                        </m:r>
+                      </m:sup>
+                    </m:sSup>
+                    <m:r>
+                      <a:rPr lang="en-GB" sz="1600" b="0" i="0" smtClean="0">
+                        <a:latin typeface="Cambria Math" panose="02040503050406030204" pitchFamily="18" charset="0"/>
+                        <a:cs typeface="Times New Roman" panose="02020603050405020304" pitchFamily="18" charset="0"/>
+                      </a:rPr>
+                      <m:t>)</m:t>
+                    </m:r>
+                    <m:f>
+                      <m:fPr>
+                        <m:ctrlPr>
+                          <a:rPr lang="en-GB" sz="1600" b="0" i="1" smtClean="0">
+                            <a:latin typeface="Cambria Math" panose="02040503050406030204" pitchFamily="18" charset="0"/>
+                            <a:cs typeface="Times New Roman" panose="02020603050405020304" pitchFamily="18" charset="0"/>
+                          </a:rPr>
+                        </m:ctrlPr>
+                      </m:fPr>
+                      <m:num>
+                        <m:r>
+                          <a:rPr lang="en-GB" sz="1600" i="0">
+                            <a:latin typeface="Cambria Math" panose="02040503050406030204" pitchFamily="18" charset="0"/>
+                            <a:cs typeface="Times New Roman" panose="02020603050405020304" pitchFamily="18" charset="0"/>
+                          </a:rPr>
+                          <m:t> </m:t>
+                        </m:r>
+                        <m:r>
+                          <m:rPr>
+                            <m:nor/>
+                          </m:rPr>
+                          <a:rPr lang="en-GB" sz="1600" dirty="0">
+                            <a:latin typeface="Times New Roman" panose="02020603050405020304" pitchFamily="18" charset="0"/>
+                            <a:cs typeface="Times New Roman" panose="02020603050405020304" pitchFamily="18" charset="0"/>
+                          </a:rPr>
+                          <m:t> </m:t>
+                        </m:r>
+                        <m:sSub>
+                          <m:sSubPr>
+                            <m:ctrlPr>
+                              <a:rPr lang="en-GB" sz="1600" i="1" dirty="0" smtClean="0">
+                                <a:latin typeface="Cambria Math" panose="02040503050406030204" pitchFamily="18" charset="0"/>
+                                <a:cs typeface="Times New Roman" panose="02020603050405020304" pitchFamily="18" charset="0"/>
+                              </a:rPr>
+                            </m:ctrlPr>
+                          </m:sSubPr>
+                          <m:e>
+                            <m:r>
+                              <m:rPr>
+                                <m:sty m:val="p"/>
+                              </m:rPr>
+                              <a:rPr lang="en-GB" sz="1600" b="0" i="0" dirty="0" smtClean="0">
+                                <a:latin typeface="Cambria Math" panose="02040503050406030204" pitchFamily="18" charset="0"/>
+                                <a:cs typeface="Times New Roman" panose="02020603050405020304" pitchFamily="18" charset="0"/>
+                              </a:rPr>
+                              <m:t>P</m:t>
+                            </m:r>
+                          </m:e>
+                          <m:sub>
+                            <m:r>
+                              <m:rPr>
+                                <m:sty m:val="p"/>
+                              </m:rPr>
+                              <a:rPr lang="en-GB" sz="1600" b="0" i="0" dirty="0" smtClean="0">
+                                <a:latin typeface="Cambria Math" panose="02040503050406030204" pitchFamily="18" charset="0"/>
+                                <a:cs typeface="Times New Roman" panose="02020603050405020304" pitchFamily="18" charset="0"/>
+                              </a:rPr>
+                              <m:t>w</m:t>
+                            </m:r>
+                          </m:sub>
+                        </m:sSub>
+                      </m:num>
+                      <m:den>
+                        <m:sSup>
+                          <m:sSupPr>
+                            <m:ctrlPr>
+                              <a:rPr lang="en-GB" sz="1600" b="0" i="1" smtClean="0">
+                                <a:latin typeface="Cambria Math" panose="02040503050406030204" pitchFamily="18" charset="0"/>
+                                <a:cs typeface="Times New Roman" panose="02020603050405020304" pitchFamily="18" charset="0"/>
+                              </a:rPr>
+                            </m:ctrlPr>
+                          </m:sSupPr>
+                          <m:e>
+                            <m:r>
+                              <m:rPr>
+                                <m:sty m:val="p"/>
+                              </m:rPr>
+                              <a:rPr lang="en-GB" sz="1600" b="0" i="0" smtClean="0">
+                                <a:latin typeface="Cambria Math" panose="02040503050406030204" pitchFamily="18" charset="0"/>
+                                <a:cs typeface="Times New Roman" panose="02020603050405020304" pitchFamily="18" charset="0"/>
+                              </a:rPr>
+                              <m:t>T</m:t>
+                            </m:r>
+                          </m:e>
+                          <m:sup>
+                            <m:r>
+                              <a:rPr lang="en-GB" sz="1600" b="0" i="0" smtClean="0">
+                                <a:latin typeface="Cambria Math" panose="02040503050406030204" pitchFamily="18" charset="0"/>
+                                <a:cs typeface="Times New Roman" panose="02020603050405020304" pitchFamily="18" charset="0"/>
+                              </a:rPr>
+                              <m:t>2</m:t>
+                            </m:r>
+                          </m:sup>
+                        </m:sSup>
+                      </m:den>
+                    </m:f>
+                  </m:oMath>
+                </a14:m>
+                <a:r>
+                  <a:rPr lang="en-GB" sz="1600" dirty="0" smtClean="0">
+                    <a:latin typeface="Times New Roman" panose="02020603050405020304" pitchFamily="18" charset="0"/>
+                    <a:cs typeface="Times New Roman" panose="02020603050405020304" pitchFamily="18" charset="0"/>
+                  </a:rPr>
+                  <a:t> ppm</a:t>
+                </a:r>
+              </a:p>
+              <a:p>
+                <a:pPr marL="0" indent="0" algn="ctr">
+                  <a:buNone/>
+                </a:pPr>
+                <a:endParaRPr lang="en-GB" sz="1600" dirty="0" smtClean="0">
+                  <a:latin typeface="Times New Roman" panose="02020603050405020304" pitchFamily="18" charset="0"/>
+                  <a:cs typeface="Times New Roman" panose="02020603050405020304" pitchFamily="18" charset="0"/>
+                </a:endParaRPr>
+              </a:p>
+              <a:p>
+                <a:pPr algn="ctr"/>
+                <a:r>
+                  <a:rPr lang="en-GB" sz="1600" dirty="0" smtClean="0">
+                    <a:latin typeface="Times New Roman" panose="02020603050405020304" pitchFamily="18" charset="0"/>
+                    <a:cs typeface="Times New Roman" panose="02020603050405020304" pitchFamily="18" charset="0"/>
+                  </a:rPr>
+                  <a:t>Temperature T, varies with height as:</a:t>
+                </a:r>
+              </a:p>
+              <a:p>
+                <a:pPr marL="0" indent="0" algn="ctr">
+                  <a:buNone/>
+                </a:pPr>
+                <a14:m>
+                  <m:oMath xmlns:m="http://schemas.openxmlformats.org/officeDocument/2006/math">
+                    <m:r>
+                      <a:rPr lang="en-GB" sz="1600" b="0" i="1" smtClean="0">
+                        <a:latin typeface="Cambria Math" panose="02040503050406030204" pitchFamily="18" charset="0"/>
+                        <a:cs typeface="Times New Roman" panose="02020603050405020304" pitchFamily="18" charset="0"/>
+                      </a:rPr>
+                      <m:t>𝑇</m:t>
+                    </m:r>
+                    <m:r>
+                      <a:rPr lang="en-GB" sz="1600" b="0" i="1" smtClean="0">
+                        <a:latin typeface="Cambria Math" panose="02040503050406030204" pitchFamily="18" charset="0"/>
+                        <a:cs typeface="Times New Roman" panose="02020603050405020304" pitchFamily="18" charset="0"/>
+                      </a:rPr>
+                      <m:t>=−</m:t>
+                    </m:r>
+                    <m:r>
+                      <a:rPr lang="en-GB" sz="1600" b="0" i="1" smtClean="0">
+                        <a:latin typeface="Cambria Math" panose="02040503050406030204" pitchFamily="18" charset="0"/>
+                        <a:ea typeface="Cambria Math" panose="02040503050406030204" pitchFamily="18" charset="0"/>
+                        <a:cs typeface="Times New Roman" panose="02020603050405020304" pitchFamily="18" charset="0"/>
+                      </a:rPr>
+                      <m:t>𝛽</m:t>
+                    </m:r>
+                    <m:r>
+                      <a:rPr lang="en-GB" sz="1600" b="0" i="1" smtClean="0">
+                        <a:latin typeface="Cambria Math" panose="02040503050406030204" pitchFamily="18" charset="0"/>
+                        <a:ea typeface="Cambria Math" panose="02040503050406030204" pitchFamily="18" charset="0"/>
+                        <a:cs typeface="Times New Roman" panose="02020603050405020304" pitchFamily="18" charset="0"/>
+                      </a:rPr>
+                      <m:t>[</m:t>
+                    </m:r>
+                    <m:r>
+                      <a:rPr lang="en-GB" sz="1600" b="0" i="1" smtClean="0">
+                        <a:latin typeface="Cambria Math" panose="02040503050406030204" pitchFamily="18" charset="0"/>
+                        <a:ea typeface="Cambria Math" panose="02040503050406030204" pitchFamily="18" charset="0"/>
+                        <a:cs typeface="Times New Roman" panose="02020603050405020304" pitchFamily="18" charset="0"/>
+                      </a:rPr>
+                      <m:t>𝐾𝑘</m:t>
+                    </m:r>
+                    <m:sSup>
+                      <m:sSupPr>
+                        <m:ctrlPr>
+                          <a:rPr lang="en-GB" sz="1600" b="0" i="1" smtClean="0">
+                            <a:latin typeface="Cambria Math" panose="02040503050406030204" pitchFamily="18" charset="0"/>
+                            <a:ea typeface="Cambria Math" panose="02040503050406030204" pitchFamily="18" charset="0"/>
+                            <a:cs typeface="Times New Roman" panose="02020603050405020304" pitchFamily="18" charset="0"/>
+                          </a:rPr>
+                        </m:ctrlPr>
+                      </m:sSupPr>
+                      <m:e>
+                        <m:r>
+                          <a:rPr lang="en-GB" sz="1600" b="0" i="1" smtClean="0">
+                            <a:latin typeface="Cambria Math" panose="02040503050406030204" pitchFamily="18" charset="0"/>
+                            <a:ea typeface="Cambria Math" panose="02040503050406030204" pitchFamily="18" charset="0"/>
+                            <a:cs typeface="Times New Roman" panose="02020603050405020304" pitchFamily="18" charset="0"/>
+                          </a:rPr>
+                          <m:t>𝑚</m:t>
+                        </m:r>
+                      </m:e>
+                      <m:sup>
+                        <m:r>
+                          <a:rPr lang="en-GB" sz="1600" b="0" i="1" smtClean="0">
+                            <a:latin typeface="Cambria Math" panose="02040503050406030204" pitchFamily="18" charset="0"/>
+                            <a:ea typeface="Cambria Math" panose="02040503050406030204" pitchFamily="18" charset="0"/>
+                            <a:cs typeface="Times New Roman" panose="02020603050405020304" pitchFamily="18" charset="0"/>
+                          </a:rPr>
+                          <m:t>−1</m:t>
+                        </m:r>
+                      </m:sup>
+                    </m:sSup>
+                  </m:oMath>
+                </a14:m>
+                <a:r>
+                  <a:rPr lang="en-GB" sz="1600" dirty="0" smtClean="0">
+                    <a:latin typeface="Times New Roman" panose="02020603050405020304" pitchFamily="18" charset="0"/>
+                    <a:cs typeface="Times New Roman" panose="02020603050405020304" pitchFamily="18" charset="0"/>
+                  </a:rPr>
+                  <a:t>](</a:t>
+                </a:r>
+                <a14:m>
+                  <m:oMath xmlns:m="http://schemas.openxmlformats.org/officeDocument/2006/math">
+                    <m:r>
+                      <a:rPr lang="en-GB" sz="1600" b="0" i="1" dirty="0" smtClean="0">
+                        <a:latin typeface="Cambria Math" panose="02040503050406030204" pitchFamily="18" charset="0"/>
+                        <a:cs typeface="Times New Roman" panose="02020603050405020304" pitchFamily="18" charset="0"/>
+                      </a:rPr>
+                      <m:t>𝐻</m:t>
+                    </m:r>
+                    <m:r>
+                      <a:rPr lang="en-GB" sz="1600" b="0" i="1" dirty="0" smtClean="0">
+                        <a:latin typeface="Cambria Math" panose="02040503050406030204" pitchFamily="18" charset="0"/>
+                        <a:cs typeface="Times New Roman" panose="02020603050405020304" pitchFamily="18" charset="0"/>
+                      </a:rPr>
+                      <m:t> − </m:t>
+                    </m:r>
+                    <m:sSub>
+                      <m:sSubPr>
+                        <m:ctrlPr>
+                          <a:rPr lang="en-GB" sz="1600" b="0" i="1" dirty="0" smtClean="0">
+                            <a:latin typeface="Cambria Math" panose="02040503050406030204" pitchFamily="18" charset="0"/>
+                            <a:cs typeface="Times New Roman" panose="02020603050405020304" pitchFamily="18" charset="0"/>
+                          </a:rPr>
+                        </m:ctrlPr>
+                      </m:sSubPr>
+                      <m:e>
+                        <m:r>
+                          <a:rPr lang="en-GB" sz="1600" b="0" i="1" dirty="0" smtClean="0">
+                            <a:latin typeface="Cambria Math" panose="02040503050406030204" pitchFamily="18" charset="0"/>
+                            <a:cs typeface="Times New Roman" panose="02020603050405020304" pitchFamily="18" charset="0"/>
+                          </a:rPr>
+                          <m:t>𝐻</m:t>
+                        </m:r>
+                      </m:e>
+                      <m:sub>
+                        <m:r>
+                          <a:rPr lang="en-GB" sz="1600" b="0" i="1" dirty="0" smtClean="0">
+                            <a:latin typeface="Cambria Math" panose="02040503050406030204" pitchFamily="18" charset="0"/>
+                            <a:cs typeface="Times New Roman" panose="02020603050405020304" pitchFamily="18" charset="0"/>
+                          </a:rPr>
+                          <m:t>𝑏</m:t>
+                        </m:r>
+                      </m:sub>
+                    </m:sSub>
+                    <m:r>
+                      <a:rPr lang="en-GB" sz="1600" b="0" i="1" dirty="0" smtClean="0">
+                        <a:latin typeface="Cambria Math" panose="02040503050406030204" pitchFamily="18" charset="0"/>
+                        <a:cs typeface="Times New Roman" panose="02020603050405020304" pitchFamily="18" charset="0"/>
+                      </a:rPr>
+                      <m:t>)</m:t>
+                    </m:r>
+                  </m:oMath>
+                </a14:m>
+                <a:r>
+                  <a:rPr lang="en-GB" sz="1600" dirty="0" smtClean="0">
+                    <a:latin typeface="Times New Roman" panose="02020603050405020304" pitchFamily="18" charset="0"/>
+                    <a:cs typeface="Times New Roman" panose="02020603050405020304" pitchFamily="18" charset="0"/>
+                  </a:rPr>
+                  <a:t> </a:t>
+                </a:r>
+                <a14:m>
+                  <m:oMath xmlns:m="http://schemas.openxmlformats.org/officeDocument/2006/math">
+                    <m:r>
+                      <a:rPr lang="en-GB" sz="1600" b="0" i="1" smtClean="0">
+                        <a:latin typeface="Cambria Math" panose="02040503050406030204" pitchFamily="18" charset="0"/>
+                        <a:cs typeface="Times New Roman" panose="02020603050405020304" pitchFamily="18" charset="0"/>
+                      </a:rPr>
+                      <m:t>+</m:t>
+                    </m:r>
+                    <m:sSub>
+                      <m:sSubPr>
+                        <m:ctrlPr>
+                          <a:rPr lang="en-GB" sz="1600" b="0" i="1" smtClean="0">
+                            <a:latin typeface="Cambria Math" panose="02040503050406030204" pitchFamily="18" charset="0"/>
+                            <a:cs typeface="Times New Roman" panose="02020603050405020304" pitchFamily="18" charset="0"/>
+                          </a:rPr>
+                        </m:ctrlPr>
+                      </m:sSubPr>
+                      <m:e>
+                        <m:r>
+                          <a:rPr lang="en-GB" sz="1600" b="0" i="1" smtClean="0">
+                            <a:latin typeface="Cambria Math" panose="02040503050406030204" pitchFamily="18" charset="0"/>
+                            <a:cs typeface="Times New Roman" panose="02020603050405020304" pitchFamily="18" charset="0"/>
+                          </a:rPr>
+                          <m:t>𝑇</m:t>
+                        </m:r>
+                      </m:e>
+                      <m:sub>
+                        <m:r>
+                          <a:rPr lang="en-GB" sz="1600" b="0" i="1" smtClean="0">
+                            <a:latin typeface="Cambria Math" panose="02040503050406030204" pitchFamily="18" charset="0"/>
+                            <a:cs typeface="Times New Roman" panose="02020603050405020304" pitchFamily="18" charset="0"/>
+                          </a:rPr>
+                          <m:t>𝑏</m:t>
+                        </m:r>
+                      </m:sub>
+                    </m:sSub>
+                  </m:oMath>
+                </a14:m>
+                <a:endParaRPr lang="en-GB" sz="1600" dirty="0" smtClean="0">
+                  <a:latin typeface="Times New Roman" panose="02020603050405020304" pitchFamily="18" charset="0"/>
+                  <a:cs typeface="Times New Roman" panose="02020603050405020304" pitchFamily="18" charset="0"/>
+                </a:endParaRPr>
+              </a:p>
+              <a:p>
+                <a:pPr marL="0" indent="0" algn="ctr">
+                  <a:buNone/>
+                </a:pPr>
+                <a:endParaRPr lang="en-GB" sz="1600" dirty="0" smtClean="0">
+                  <a:latin typeface="Times New Roman" panose="02020603050405020304" pitchFamily="18" charset="0"/>
+                  <a:cs typeface="Times New Roman" panose="02020603050405020304" pitchFamily="18" charset="0"/>
+                </a:endParaRPr>
+              </a:p>
+              <a:p>
+                <a:pPr algn="ctr"/>
+                <a:r>
+                  <a:rPr lang="en-GB" sz="1600" dirty="0" smtClean="0">
+                    <a:latin typeface="Times New Roman" panose="02020603050405020304" pitchFamily="18" charset="0"/>
+                    <a:cs typeface="Times New Roman" panose="02020603050405020304" pitchFamily="18" charset="0"/>
+                  </a:rPr>
+                  <a:t>Where the total pressure </a:t>
+                </a:r>
+                <a14:m>
+                  <m:oMath xmlns:m="http://schemas.openxmlformats.org/officeDocument/2006/math">
+                    <m:r>
+                      <m:rPr>
+                        <m:sty m:val="p"/>
+                      </m:rPr>
+                      <a:rPr lang="en-GB" sz="1600" dirty="0">
+                        <a:latin typeface="Cambria Math" panose="02040503050406030204" pitchFamily="18" charset="0"/>
+                        <a:cs typeface="Times New Roman" panose="02020603050405020304" pitchFamily="18" charset="0"/>
+                      </a:rPr>
+                      <m:t>P</m:t>
+                    </m:r>
+                  </m:oMath>
+                </a14:m>
+                <a:r>
+                  <a:rPr lang="en-GB" sz="1600" dirty="0" smtClean="0">
+                    <a:latin typeface="Times New Roman" panose="02020603050405020304" pitchFamily="18" charset="0"/>
+                    <a:cs typeface="Times New Roman" panose="02020603050405020304" pitchFamily="18" charset="0"/>
+                  </a:rPr>
+                  <a:t> is</a:t>
+                </a:r>
+                <a:r>
+                  <a:rPr lang="en-GB" sz="1600" baseline="30000" dirty="0" smtClean="0">
+                    <a:latin typeface="Times New Roman" panose="02020603050405020304" pitchFamily="18" charset="0"/>
+                    <a:cs typeface="Times New Roman" panose="02020603050405020304" pitchFamily="18" charset="0"/>
+                  </a:rPr>
+                  <a:t>2</a:t>
+                </a:r>
+                <a:r>
+                  <a:rPr lang="en-GB" sz="1600" dirty="0" smtClean="0">
+                    <a:latin typeface="Times New Roman" panose="02020603050405020304" pitchFamily="18" charset="0"/>
+                    <a:cs typeface="Times New Roman" panose="02020603050405020304" pitchFamily="18" charset="0"/>
+                  </a:rPr>
+                  <a:t>:</a:t>
+                </a:r>
+              </a:p>
+              <a:p>
+                <a:pPr marL="0" indent="0" algn="ctr">
+                  <a:buNone/>
+                </a:pPr>
+                <a:r>
+                  <a:rPr lang="en-GB" sz="1600" dirty="0" smtClean="0">
+                    <a:latin typeface="Times New Roman" panose="02020603050405020304" pitchFamily="18" charset="0"/>
+                    <a:cs typeface="Times New Roman" panose="02020603050405020304" pitchFamily="18" charset="0"/>
+                  </a:rPr>
+                  <a:t>P = </a:t>
+                </a:r>
+                <a:r>
+                  <a:rPr lang="en-GB" sz="1600" dirty="0" err="1" smtClean="0">
+                    <a:latin typeface="Times New Roman" panose="02020603050405020304" pitchFamily="18" charset="0"/>
+                    <a:cs typeface="Times New Roman" panose="02020603050405020304" pitchFamily="18" charset="0"/>
+                  </a:rPr>
+                  <a:t>P</a:t>
+                </a:r>
+                <a:r>
+                  <a:rPr lang="en-GB" sz="1600" baseline="-25000" dirty="0" err="1" smtClean="0">
+                    <a:latin typeface="Times New Roman" panose="02020603050405020304" pitchFamily="18" charset="0"/>
+                    <a:cs typeface="Times New Roman" panose="02020603050405020304" pitchFamily="18" charset="0"/>
+                  </a:rPr>
+                  <a:t>b</a:t>
+                </a:r>
+                <a:r>
+                  <a:rPr lang="en-GB" sz="1600" dirty="0" smtClean="0">
+                    <a:latin typeface="Times New Roman" panose="02020603050405020304" pitchFamily="18" charset="0"/>
+                    <a:cs typeface="Times New Roman" panose="02020603050405020304" pitchFamily="18" charset="0"/>
+                  </a:rPr>
+                  <a:t> </a:t>
+                </a:r>
+                <a14:m>
+                  <m:oMath xmlns:m="http://schemas.openxmlformats.org/officeDocument/2006/math">
+                    <m:sSup>
+                      <m:sSupPr>
+                        <m:ctrlPr>
+                          <a:rPr lang="en-GB" sz="1600" smtClean="0">
+                            <a:latin typeface="Cambria Math" panose="02040503050406030204" pitchFamily="18" charset="0"/>
+                            <a:cs typeface="Times New Roman" panose="02020603050405020304" pitchFamily="18" charset="0"/>
+                          </a:rPr>
+                        </m:ctrlPr>
+                      </m:sSupPr>
+                      <m:e>
+                        <m:d>
+                          <m:dPr>
+                            <m:begChr m:val="["/>
+                            <m:endChr m:val="]"/>
+                            <m:ctrlPr>
+                              <a:rPr lang="en-GB" sz="1600">
+                                <a:latin typeface="Cambria Math" panose="02040503050406030204" pitchFamily="18" charset="0"/>
+                                <a:cs typeface="Times New Roman" panose="02020603050405020304" pitchFamily="18" charset="0"/>
+                              </a:rPr>
+                            </m:ctrlPr>
+                          </m:dPr>
+                          <m:e>
+                            <m:r>
+                              <a:rPr lang="en-GB" sz="1600" i="0">
+                                <a:latin typeface="Cambria Math" panose="02040503050406030204" pitchFamily="18" charset="0"/>
+                                <a:cs typeface="Times New Roman" panose="02020603050405020304" pitchFamily="18" charset="0"/>
+                              </a:rPr>
+                              <m:t>1+ </m:t>
+                            </m:r>
+                            <m:f>
+                              <m:fPr>
+                                <m:ctrlPr>
+                                  <a:rPr lang="en-GB" sz="1600">
+                                    <a:latin typeface="Cambria Math" panose="02040503050406030204" pitchFamily="18" charset="0"/>
+                                    <a:cs typeface="Times New Roman" panose="02020603050405020304" pitchFamily="18" charset="0"/>
+                                  </a:rPr>
+                                </m:ctrlPr>
+                              </m:fPr>
+                              <m:num>
+                                <m:r>
+                                  <m:rPr>
+                                    <m:sty m:val="p"/>
+                                  </m:rPr>
+                                  <a:rPr lang="en-GB" sz="1600" i="0">
+                                    <a:latin typeface="Cambria Math" panose="02040503050406030204" pitchFamily="18" charset="0"/>
+                                    <a:ea typeface="Cambria Math" panose="02040503050406030204" pitchFamily="18" charset="0"/>
+                                    <a:cs typeface="Times New Roman" panose="02020603050405020304" pitchFamily="18" charset="0"/>
+                                  </a:rPr>
+                                  <m:t>β</m:t>
+                                </m:r>
+                              </m:num>
+                              <m:den>
+                                <m:sSub>
+                                  <m:sSubPr>
+                                    <m:ctrlPr>
+                                      <a:rPr lang="en-GB" sz="1600">
+                                        <a:latin typeface="Cambria Math" panose="02040503050406030204" pitchFamily="18" charset="0"/>
+                                        <a:cs typeface="Times New Roman" panose="02020603050405020304" pitchFamily="18" charset="0"/>
+                                      </a:rPr>
+                                    </m:ctrlPr>
+                                  </m:sSubPr>
+                                  <m:e>
+                                    <m:r>
+                                      <m:rPr>
+                                        <m:sty m:val="p"/>
+                                      </m:rPr>
+                                      <a:rPr lang="en-GB" sz="1600" i="0">
+                                        <a:latin typeface="Cambria Math" panose="02040503050406030204" pitchFamily="18" charset="0"/>
+                                        <a:cs typeface="Times New Roman" panose="02020603050405020304" pitchFamily="18" charset="0"/>
+                                      </a:rPr>
+                                      <m:t>T</m:t>
+                                    </m:r>
+                                  </m:e>
+                                  <m:sub>
+                                    <m:r>
+                                      <m:rPr>
+                                        <m:sty m:val="p"/>
+                                      </m:rPr>
+                                      <a:rPr lang="en-GB" sz="1600" i="0">
+                                        <a:latin typeface="Cambria Math" panose="02040503050406030204" pitchFamily="18" charset="0"/>
+                                        <a:cs typeface="Times New Roman" panose="02020603050405020304" pitchFamily="18" charset="0"/>
+                                      </a:rPr>
+                                      <m:t>b</m:t>
+                                    </m:r>
+                                  </m:sub>
+                                </m:sSub>
+                              </m:den>
+                            </m:f>
+                            <m:r>
+                              <a:rPr lang="en-GB" sz="1600" i="0">
+                                <a:latin typeface="Cambria Math" panose="02040503050406030204" pitchFamily="18" charset="0"/>
+                                <a:cs typeface="Times New Roman" panose="02020603050405020304" pitchFamily="18" charset="0"/>
+                              </a:rPr>
+                              <m:t> (</m:t>
+                            </m:r>
+                            <m:r>
+                              <m:rPr>
+                                <m:sty m:val="p"/>
+                              </m:rPr>
+                              <a:rPr lang="en-GB" sz="1600" i="0">
+                                <a:latin typeface="Cambria Math" panose="02040503050406030204" pitchFamily="18" charset="0"/>
+                                <a:cs typeface="Times New Roman" panose="02020603050405020304" pitchFamily="18" charset="0"/>
+                              </a:rPr>
+                              <m:t>H</m:t>
+                            </m:r>
+                            <m:r>
+                              <a:rPr lang="en-GB" sz="1600" i="0">
+                                <a:latin typeface="Cambria Math" panose="02040503050406030204" pitchFamily="18" charset="0"/>
+                                <a:cs typeface="Times New Roman" panose="02020603050405020304" pitchFamily="18" charset="0"/>
+                              </a:rPr>
+                              <m:t>−</m:t>
+                            </m:r>
+                            <m:sSub>
+                              <m:sSubPr>
+                                <m:ctrlPr>
+                                  <a:rPr lang="en-GB" sz="1600">
+                                    <a:latin typeface="Cambria Math" panose="02040503050406030204" pitchFamily="18" charset="0"/>
+                                    <a:cs typeface="Times New Roman" panose="02020603050405020304" pitchFamily="18" charset="0"/>
+                                  </a:rPr>
+                                </m:ctrlPr>
+                              </m:sSubPr>
+                              <m:e>
+                                <m:r>
+                                  <m:rPr>
+                                    <m:sty m:val="p"/>
+                                  </m:rPr>
+                                  <a:rPr lang="en-GB" sz="1600" i="0">
+                                    <a:latin typeface="Cambria Math" panose="02040503050406030204" pitchFamily="18" charset="0"/>
+                                    <a:cs typeface="Times New Roman" panose="02020603050405020304" pitchFamily="18" charset="0"/>
+                                  </a:rPr>
+                                  <m:t>H</m:t>
+                                </m:r>
+                              </m:e>
+                              <m:sub>
+                                <m:r>
+                                  <m:rPr>
+                                    <m:sty m:val="p"/>
+                                  </m:rPr>
+                                  <a:rPr lang="en-GB" sz="1600" i="0">
+                                    <a:latin typeface="Cambria Math" panose="02040503050406030204" pitchFamily="18" charset="0"/>
+                                    <a:cs typeface="Times New Roman" panose="02020603050405020304" pitchFamily="18" charset="0"/>
+                                  </a:rPr>
+                                  <m:t>b</m:t>
+                                </m:r>
+                                <m:r>
+                                  <a:rPr lang="en-GB" sz="1600" i="0">
+                                    <a:latin typeface="Cambria Math" panose="02040503050406030204" pitchFamily="18" charset="0"/>
+                                    <a:cs typeface="Times New Roman" panose="02020603050405020304" pitchFamily="18" charset="0"/>
+                                  </a:rPr>
+                                  <m:t> </m:t>
+                                </m:r>
+                              </m:sub>
+                            </m:sSub>
+                            <m:r>
+                              <a:rPr lang="en-GB" sz="1600" i="0">
+                                <a:latin typeface="Cambria Math" panose="02040503050406030204" pitchFamily="18" charset="0"/>
+                                <a:cs typeface="Times New Roman" panose="02020603050405020304" pitchFamily="18" charset="0"/>
+                              </a:rPr>
+                              <m:t>)</m:t>
+                            </m:r>
+                          </m:e>
+                        </m:d>
+                      </m:e>
+                      <m:sup>
+                        <m:r>
+                          <a:rPr lang="en-GB" sz="1600" b="0" i="0" smtClean="0">
+                            <a:latin typeface="Cambria Math" panose="02040503050406030204" pitchFamily="18" charset="0"/>
+                            <a:cs typeface="Times New Roman" panose="02020603050405020304" pitchFamily="18" charset="0"/>
+                          </a:rPr>
+                          <m:t>−</m:t>
+                        </m:r>
+                        <m:f>
+                          <m:fPr>
+                            <m:ctrlPr>
+                              <a:rPr lang="en-GB" sz="1600" b="0" smtClean="0">
+                                <a:latin typeface="Cambria Math" panose="02040503050406030204" pitchFamily="18" charset="0"/>
+                                <a:cs typeface="Times New Roman" panose="02020603050405020304" pitchFamily="18" charset="0"/>
+                              </a:rPr>
+                            </m:ctrlPr>
+                          </m:fPr>
+                          <m:num>
+                            <m:r>
+                              <m:rPr>
+                                <m:sty m:val="p"/>
+                              </m:rPr>
+                              <a:rPr lang="en-GB" sz="1600" b="0" i="0" smtClean="0">
+                                <a:latin typeface="Cambria Math" panose="02040503050406030204" pitchFamily="18" charset="0"/>
+                                <a:cs typeface="Times New Roman" panose="02020603050405020304" pitchFamily="18" charset="0"/>
+                              </a:rPr>
+                              <m:t>g</m:t>
+                            </m:r>
+                            <m:sSub>
+                              <m:sSubPr>
+                                <m:ctrlPr>
+                                  <a:rPr lang="en-GB" sz="1600" b="0" smtClean="0">
+                                    <a:latin typeface="Cambria Math" panose="02040503050406030204" pitchFamily="18" charset="0"/>
+                                    <a:cs typeface="Times New Roman" panose="02020603050405020304" pitchFamily="18" charset="0"/>
+                                  </a:rPr>
+                                </m:ctrlPr>
+                              </m:sSubPr>
+                              <m:e>
+                                <m:r>
+                                  <m:rPr>
+                                    <m:sty m:val="p"/>
+                                  </m:rPr>
+                                  <a:rPr lang="en-GB" sz="1600" b="0" i="0" smtClean="0">
+                                    <a:latin typeface="Cambria Math" panose="02040503050406030204" pitchFamily="18" charset="0"/>
+                                    <a:cs typeface="Times New Roman" panose="02020603050405020304" pitchFamily="18" charset="0"/>
+                                  </a:rPr>
+                                  <m:t>M</m:t>
+                                </m:r>
+                              </m:e>
+                              <m:sub>
+                                <m:r>
+                                  <a:rPr lang="en-GB" sz="1600" b="0" i="0" smtClean="0">
+                                    <a:latin typeface="Cambria Math" panose="02040503050406030204" pitchFamily="18" charset="0"/>
+                                    <a:cs typeface="Times New Roman" panose="02020603050405020304" pitchFamily="18" charset="0"/>
+                                  </a:rPr>
+                                  <m:t>0</m:t>
+                                </m:r>
+                              </m:sub>
+                            </m:sSub>
+                          </m:num>
+                          <m:den>
+                            <m:r>
+                              <m:rPr>
+                                <m:sty m:val="p"/>
+                              </m:rPr>
+                              <a:rPr lang="en-GB" sz="1600" b="0" i="0" smtClean="0">
+                                <a:latin typeface="Cambria Math" panose="02040503050406030204" pitchFamily="18" charset="0"/>
+                                <a:ea typeface="Cambria Math" panose="02040503050406030204" pitchFamily="18" charset="0"/>
+                                <a:cs typeface="Times New Roman" panose="02020603050405020304" pitchFamily="18" charset="0"/>
+                              </a:rPr>
+                              <m:t>βR</m:t>
+                            </m:r>
+                          </m:den>
+                        </m:f>
+                      </m:sup>
+                    </m:sSup>
+                  </m:oMath>
+                </a14:m>
+                <a:endParaRPr lang="en-GB" sz="1600" dirty="0" smtClean="0">
+                  <a:latin typeface="Times New Roman" panose="02020603050405020304" pitchFamily="18" charset="0"/>
+                  <a:cs typeface="Times New Roman" panose="02020603050405020304" pitchFamily="18" charset="0"/>
+                </a:endParaRPr>
+              </a:p>
+              <a:p>
+                <a:pPr marL="0" indent="0" algn="ctr">
+                  <a:buNone/>
+                </a:pPr>
+                <a:endParaRPr lang="en-GB" sz="1600" dirty="0">
+                  <a:latin typeface="Times New Roman" panose="02020603050405020304" pitchFamily="18" charset="0"/>
+                  <a:cs typeface="Times New Roman" panose="02020603050405020304" pitchFamily="18" charset="0"/>
+                </a:endParaRPr>
+              </a:p>
+              <a:p>
+                <a:pPr algn="ctr"/>
+                <a:r>
+                  <a:rPr lang="en-GB" sz="1600" dirty="0" smtClean="0">
+                    <a:latin typeface="Times New Roman" panose="02020603050405020304" pitchFamily="18" charset="0"/>
+                    <a:cs typeface="Times New Roman" panose="02020603050405020304" pitchFamily="18" charset="0"/>
+                  </a:rPr>
+                  <a:t>Use Arden-Buck</a:t>
+                </a:r>
+                <a:r>
+                  <a:rPr lang="en-GB" sz="1600" baseline="30000" dirty="0">
+                    <a:latin typeface="Times New Roman" panose="02020603050405020304" pitchFamily="18" charset="0"/>
+                    <a:cs typeface="Times New Roman" panose="02020603050405020304" pitchFamily="18" charset="0"/>
+                  </a:rPr>
+                  <a:t>3</a:t>
+                </a:r>
+                <a:r>
+                  <a:rPr lang="en-GB" sz="1600" dirty="0" smtClean="0">
+                    <a:latin typeface="Times New Roman" panose="02020603050405020304" pitchFamily="18" charset="0"/>
+                    <a:cs typeface="Times New Roman" panose="02020603050405020304" pitchFamily="18" charset="0"/>
+                  </a:rPr>
+                  <a:t> equation to re-express partial pressure of water </a:t>
+                </a:r>
+                <a:r>
+                  <a:rPr lang="en-GB" sz="1600" dirty="0" smtClean="0">
+                    <a:latin typeface="Times New Roman" panose="02020603050405020304" pitchFamily="18" charset="0"/>
+                    <a:cs typeface="Times New Roman" panose="02020603050405020304" pitchFamily="18" charset="0"/>
+                  </a:rPr>
+                  <a:t>vapour </a:t>
+                </a:r>
+                <a14:m>
+                  <m:oMath xmlns:m="http://schemas.openxmlformats.org/officeDocument/2006/math">
+                    <m:sSub>
+                      <m:sSubPr>
+                        <m:ctrlPr>
+                          <a:rPr lang="en-GB" sz="1600" i="1" dirty="0">
+                            <a:latin typeface="Cambria Math" panose="02040503050406030204" pitchFamily="18" charset="0"/>
+                            <a:cs typeface="Times New Roman" panose="02020603050405020304" pitchFamily="18" charset="0"/>
+                          </a:rPr>
+                        </m:ctrlPr>
+                      </m:sSubPr>
+                      <m:e>
+                        <m:r>
+                          <m:rPr>
+                            <m:sty m:val="p"/>
+                          </m:rPr>
+                          <a:rPr lang="en-GB" sz="1600" dirty="0">
+                            <a:latin typeface="Cambria Math" panose="02040503050406030204" pitchFamily="18" charset="0"/>
+                            <a:cs typeface="Times New Roman" panose="02020603050405020304" pitchFamily="18" charset="0"/>
+                          </a:rPr>
+                          <m:t>P</m:t>
+                        </m:r>
+                      </m:e>
+                      <m:sub>
+                        <m:r>
+                          <m:rPr>
+                            <m:sty m:val="p"/>
+                          </m:rPr>
+                          <a:rPr lang="en-GB" sz="1600" dirty="0">
+                            <a:latin typeface="Cambria Math" panose="02040503050406030204" pitchFamily="18" charset="0"/>
+                            <a:cs typeface="Times New Roman" panose="02020603050405020304" pitchFamily="18" charset="0"/>
+                          </a:rPr>
+                          <m:t>w</m:t>
+                        </m:r>
+                      </m:sub>
+                    </m:sSub>
+                    <m:r>
+                      <a:rPr lang="en-GB" sz="1600" b="0" i="0" dirty="0" smtClean="0">
+                        <a:latin typeface="Cambria Math" panose="02040503050406030204" pitchFamily="18" charset="0"/>
+                        <a:cs typeface="Times New Roman" panose="02020603050405020304" pitchFamily="18" charset="0"/>
+                      </a:rPr>
+                      <m:t>,</m:t>
+                    </m:r>
+                  </m:oMath>
+                </a14:m>
+                <a:endParaRPr lang="en-GB" sz="1600" b="0" dirty="0" smtClean="0">
+                  <a:latin typeface="Times New Roman" panose="02020603050405020304" pitchFamily="18" charset="0"/>
+                  <a:cs typeface="Times New Roman" panose="02020603050405020304" pitchFamily="18" charset="0"/>
+                </a:endParaRPr>
+              </a:p>
+              <a:p>
+                <a:pPr marL="0" indent="0" algn="ctr">
+                  <a:buNone/>
+                </a:pPr>
+                <a14:m>
+                  <m:oMathPara xmlns:m="http://schemas.openxmlformats.org/officeDocument/2006/math">
+                    <m:oMathParaPr>
+                      <m:jc m:val="centerGroup"/>
+                    </m:oMathParaPr>
+                    <m:oMath xmlns:m="http://schemas.openxmlformats.org/officeDocument/2006/math">
+                      <m:sSub>
+                        <m:sSubPr>
+                          <m:ctrlPr>
+                            <a:rPr lang="en-GB" sz="1600" i="1" dirty="0">
+                              <a:latin typeface="Cambria Math" panose="02040503050406030204" pitchFamily="18" charset="0"/>
+                              <a:cs typeface="Times New Roman" panose="02020603050405020304" pitchFamily="18" charset="0"/>
+                            </a:rPr>
+                          </m:ctrlPr>
+                        </m:sSubPr>
+                        <m:e>
+                          <m:r>
+                            <m:rPr>
+                              <m:sty m:val="p"/>
+                            </m:rPr>
+                            <a:rPr lang="en-GB" sz="1600" dirty="0">
+                              <a:latin typeface="Cambria Math" panose="02040503050406030204" pitchFamily="18" charset="0"/>
+                              <a:cs typeface="Times New Roman" panose="02020603050405020304" pitchFamily="18" charset="0"/>
+                            </a:rPr>
+                            <m:t>P</m:t>
+                          </m:r>
+                        </m:e>
+                        <m:sub>
+                          <m:r>
+                            <m:rPr>
+                              <m:sty m:val="p"/>
+                            </m:rPr>
+                            <a:rPr lang="en-GB" sz="1600" dirty="0">
+                              <a:latin typeface="Cambria Math" panose="02040503050406030204" pitchFamily="18" charset="0"/>
+                              <a:cs typeface="Times New Roman" panose="02020603050405020304" pitchFamily="18" charset="0"/>
+                            </a:rPr>
+                            <m:t>w</m:t>
+                          </m:r>
+                        </m:sub>
+                      </m:sSub>
+                      <m:r>
+                        <a:rPr lang="en-GB" sz="1600" b="0" i="0" dirty="0" smtClean="0">
+                          <a:latin typeface="Cambria Math" panose="02040503050406030204" pitchFamily="18" charset="0"/>
+                          <a:cs typeface="Times New Roman" panose="02020603050405020304" pitchFamily="18" charset="0"/>
+                        </a:rPr>
+                        <m:t>=</m:t>
+                      </m:r>
+                      <m:f>
+                        <m:fPr>
+                          <m:ctrlPr>
+                            <a:rPr lang="en-GB" sz="1600" i="1" smtClean="0">
+                              <a:latin typeface="Cambria Math" panose="02040503050406030204" pitchFamily="18" charset="0"/>
+                              <a:cs typeface="Times New Roman" panose="02020603050405020304" pitchFamily="18" charset="0"/>
+                            </a:rPr>
+                          </m:ctrlPr>
+                        </m:fPr>
+                        <m:num>
+                          <m:r>
+                            <m:rPr>
+                              <m:sty m:val="p"/>
+                            </m:rPr>
+                            <a:rPr lang="en-GB" sz="1600" b="0" i="0" smtClean="0">
+                              <a:latin typeface="Cambria Math" panose="02040503050406030204" pitchFamily="18" charset="0"/>
+                              <a:cs typeface="Times New Roman" panose="02020603050405020304" pitchFamily="18" charset="0"/>
+                            </a:rPr>
+                            <m:t>RH</m:t>
+                          </m:r>
+                        </m:num>
+                        <m:den>
+                          <m:r>
+                            <a:rPr lang="en-GB" sz="1600" b="0" i="0" smtClean="0">
+                              <a:latin typeface="Cambria Math" panose="02040503050406030204" pitchFamily="18" charset="0"/>
+                              <a:cs typeface="Times New Roman" panose="02020603050405020304" pitchFamily="18" charset="0"/>
+                            </a:rPr>
+                            <m:t>100</m:t>
+                          </m:r>
+                        </m:den>
+                      </m:f>
+                      <m:r>
+                        <a:rPr lang="en-GB" sz="1600" b="0" i="0" smtClean="0">
+                          <a:latin typeface="Cambria Math" panose="02040503050406030204" pitchFamily="18" charset="0"/>
+                          <a:ea typeface="Cambria Math" panose="02040503050406030204" pitchFamily="18" charset="0"/>
+                          <a:cs typeface="Times New Roman" panose="02020603050405020304" pitchFamily="18" charset="0"/>
+                        </a:rPr>
+                        <m:t>×</m:t>
+                      </m:r>
+                      <m:r>
+                        <a:rPr lang="en-GB" sz="1600" b="0" i="0" smtClean="0">
+                          <a:latin typeface="Cambria Math" panose="02040503050406030204" pitchFamily="18" charset="0"/>
+                          <a:cs typeface="Times New Roman" panose="02020603050405020304" pitchFamily="18" charset="0"/>
+                        </a:rPr>
+                        <m:t>6.1121</m:t>
+                      </m:r>
+                      <m:r>
+                        <a:rPr lang="en-GB" sz="1600" b="0" i="0" smtClean="0">
+                          <a:latin typeface="Cambria Math" panose="02040503050406030204" pitchFamily="18" charset="0"/>
+                          <a:ea typeface="Cambria Math" panose="02040503050406030204" pitchFamily="18" charset="0"/>
+                          <a:cs typeface="Times New Roman" panose="02020603050405020304" pitchFamily="18" charset="0"/>
+                        </a:rPr>
+                        <m:t>×</m:t>
+                      </m:r>
+                      <m:r>
+                        <m:rPr>
+                          <m:sty m:val="p"/>
+                        </m:rPr>
+                        <a:rPr lang="en-GB" sz="1600" b="0" i="0" smtClean="0">
+                          <a:latin typeface="Cambria Math" panose="02040503050406030204" pitchFamily="18" charset="0"/>
+                          <a:ea typeface="Cambria Math" panose="02040503050406030204" pitchFamily="18" charset="0"/>
+                          <a:cs typeface="Times New Roman" panose="02020603050405020304" pitchFamily="18" charset="0"/>
+                        </a:rPr>
+                        <m:t>exp</m:t>
+                      </m:r>
+                      <m:d>
+                        <m:dPr>
+                          <m:ctrlPr>
+                            <a:rPr lang="en-GB" sz="1600" i="1">
+                              <a:latin typeface="Cambria Math" panose="02040503050406030204" pitchFamily="18" charset="0"/>
+                              <a:cs typeface="Times New Roman" panose="02020603050405020304" pitchFamily="18" charset="0"/>
+                            </a:rPr>
+                          </m:ctrlPr>
+                        </m:dPr>
+                        <m:e>
+                          <m:r>
+                            <a:rPr lang="en-GB" sz="1600">
+                              <a:latin typeface="Cambria Math" panose="02040503050406030204" pitchFamily="18" charset="0"/>
+                              <a:cs typeface="Times New Roman" panose="02020603050405020304" pitchFamily="18" charset="0"/>
+                            </a:rPr>
+                            <m:t> </m:t>
+                          </m:r>
+                          <m:d>
+                            <m:dPr>
+                              <m:ctrlPr>
+                                <a:rPr lang="en-GB" sz="1600" i="1">
+                                  <a:latin typeface="Cambria Math" panose="02040503050406030204" pitchFamily="18" charset="0"/>
+                                  <a:cs typeface="Times New Roman" panose="02020603050405020304" pitchFamily="18" charset="0"/>
+                                </a:rPr>
+                              </m:ctrlPr>
+                            </m:dPr>
+                            <m:e>
+                              <m:r>
+                                <a:rPr lang="en-GB" sz="1600">
+                                  <a:latin typeface="Cambria Math" panose="02040503050406030204" pitchFamily="18" charset="0"/>
+                                  <a:cs typeface="Times New Roman" panose="02020603050405020304" pitchFamily="18" charset="0"/>
+                                </a:rPr>
+                                <m:t>18.678 − </m:t>
+                              </m:r>
+                              <m:f>
+                                <m:fPr>
+                                  <m:ctrlPr>
+                                    <a:rPr lang="en-GB" sz="1600" i="1">
+                                      <a:latin typeface="Cambria Math" panose="02040503050406030204" pitchFamily="18" charset="0"/>
+                                      <a:cs typeface="Times New Roman" panose="02020603050405020304" pitchFamily="18" charset="0"/>
+                                    </a:rPr>
+                                  </m:ctrlPr>
+                                </m:fPr>
+                                <m:num>
+                                  <m:r>
+                                    <m:rPr>
+                                      <m:sty m:val="p"/>
+                                    </m:rPr>
+                                    <a:rPr lang="en-GB" sz="1600">
+                                      <a:latin typeface="Cambria Math" panose="02040503050406030204" pitchFamily="18" charset="0"/>
+                                      <a:cs typeface="Times New Roman" panose="02020603050405020304" pitchFamily="18" charset="0"/>
+                                    </a:rPr>
+                                    <m:t>T</m:t>
+                                  </m:r>
+                                </m:num>
+                                <m:den>
+                                  <m:r>
+                                    <a:rPr lang="en-GB" sz="1600">
+                                      <a:latin typeface="Cambria Math" panose="02040503050406030204" pitchFamily="18" charset="0"/>
+                                      <a:ea typeface="Cambria Math" panose="02040503050406030204" pitchFamily="18" charset="0"/>
+                                      <a:cs typeface="Times New Roman" panose="02020603050405020304" pitchFamily="18" charset="0"/>
+                                    </a:rPr>
+                                    <m:t>234.5</m:t>
+                                  </m:r>
+                                </m:den>
+                              </m:f>
+                            </m:e>
+                          </m:d>
+                          <m:d>
+                            <m:dPr>
+                              <m:ctrlPr>
+                                <a:rPr lang="en-GB" sz="1600" i="1">
+                                  <a:latin typeface="Cambria Math" panose="02040503050406030204" pitchFamily="18" charset="0"/>
+                                  <a:cs typeface="Times New Roman" panose="02020603050405020304" pitchFamily="18" charset="0"/>
+                                </a:rPr>
+                              </m:ctrlPr>
+                            </m:dPr>
+                            <m:e>
+                              <m:r>
+                                <a:rPr lang="en-GB" sz="1600">
+                                  <a:latin typeface="Cambria Math" panose="02040503050406030204" pitchFamily="18" charset="0"/>
+                                  <a:cs typeface="Times New Roman" panose="02020603050405020304" pitchFamily="18" charset="0"/>
+                                </a:rPr>
+                                <m:t> </m:t>
+                              </m:r>
+                              <m:f>
+                                <m:fPr>
+                                  <m:ctrlPr>
+                                    <a:rPr lang="en-GB" sz="1600" i="1">
+                                      <a:latin typeface="Cambria Math" panose="02040503050406030204" pitchFamily="18" charset="0"/>
+                                      <a:cs typeface="Times New Roman" panose="02020603050405020304" pitchFamily="18" charset="0"/>
+                                    </a:rPr>
+                                  </m:ctrlPr>
+                                </m:fPr>
+                                <m:num>
+                                  <m:r>
+                                    <m:rPr>
+                                      <m:sty m:val="p"/>
+                                    </m:rPr>
+                                    <a:rPr lang="en-GB" sz="1600">
+                                      <a:latin typeface="Cambria Math" panose="02040503050406030204" pitchFamily="18" charset="0"/>
+                                      <a:cs typeface="Times New Roman" panose="02020603050405020304" pitchFamily="18" charset="0"/>
+                                    </a:rPr>
+                                    <m:t>T</m:t>
+                                  </m:r>
+                                </m:num>
+                                <m:den>
+                                  <m:r>
+                                    <a:rPr lang="en-GB" sz="1600">
+                                      <a:latin typeface="Cambria Math" panose="02040503050406030204" pitchFamily="18" charset="0"/>
+                                      <a:cs typeface="Times New Roman" panose="02020603050405020304" pitchFamily="18" charset="0"/>
+                                    </a:rPr>
+                                    <m:t>257.14+</m:t>
+                                  </m:r>
+                                  <m:r>
+                                    <m:rPr>
+                                      <m:sty m:val="p"/>
+                                    </m:rPr>
+                                    <a:rPr lang="en-GB" sz="1600">
+                                      <a:latin typeface="Cambria Math" panose="02040503050406030204" pitchFamily="18" charset="0"/>
+                                      <a:cs typeface="Times New Roman" panose="02020603050405020304" pitchFamily="18" charset="0"/>
+                                    </a:rPr>
+                                    <m:t>T</m:t>
+                                  </m:r>
+                                </m:den>
+                              </m:f>
+                            </m:e>
+                          </m:d>
+                        </m:e>
+                      </m:d>
+                    </m:oMath>
+                  </m:oMathPara>
+                </a14:m>
+                <a:endParaRPr lang="en-GB" sz="1600" dirty="0" smtClean="0">
+                  <a:latin typeface="Times New Roman" panose="02020603050405020304" pitchFamily="18" charset="0"/>
+                  <a:cs typeface="Times New Roman" panose="02020603050405020304" pitchFamily="18" charset="0"/>
+                </a:endParaRPr>
+              </a:p>
+              <a:p>
+                <a:pPr marL="0" indent="0" algn="ctr">
+                  <a:buNone/>
+                </a:pPr>
+                <a:r>
+                  <a:rPr lang="en-GB" sz="1600" dirty="0" smtClean="0">
+                    <a:latin typeface="Times New Roman" panose="02020603050405020304" pitchFamily="18" charset="0"/>
+                    <a:cs typeface="Times New Roman" panose="02020603050405020304" pitchFamily="18" charset="0"/>
+                  </a:rPr>
+                  <a:t>N.B. T is in </a:t>
+                </a:r>
+                <a:r>
+                  <a:rPr lang="en-GB" sz="1600" dirty="0" err="1" smtClean="0">
+                    <a:latin typeface="Times New Roman" panose="02020603050405020304" pitchFamily="18" charset="0"/>
+                    <a:cs typeface="Times New Roman" panose="02020603050405020304" pitchFamily="18" charset="0"/>
+                  </a:rPr>
+                  <a:t>Celcius</a:t>
+                </a:r>
+                <a:r>
+                  <a:rPr lang="en-GB" sz="1600" dirty="0" smtClean="0">
+                    <a:latin typeface="Times New Roman" panose="02020603050405020304" pitchFamily="18" charset="0"/>
+                    <a:cs typeface="Times New Roman" panose="02020603050405020304" pitchFamily="18" charset="0"/>
+                  </a:rPr>
+                  <a:t> for Arden-Buck!</a:t>
+                </a:r>
+                <a:endParaRPr lang="en-GB" sz="1600" dirty="0">
+                  <a:latin typeface="Times New Roman" panose="02020603050405020304" pitchFamily="18" charset="0"/>
+                  <a:cs typeface="Times New Roman" panose="02020603050405020304" pitchFamily="18" charset="0"/>
+                </a:endParaRPr>
+              </a:p>
+            </p:txBody>
+          </p:sp>
+        </mc:Choice>
+        <mc:Fallback>
+          <p:sp>
+            <p:nvSpPr>
+              <p:cNvPr id="5" name="Content Placeholder 2"/>
+              <p:cNvSpPr>
+                <a:spLocks noGrp="1" noRot="1" noChangeAspect="1" noMove="1" noResize="1" noEditPoints="1" noAdjustHandles="1" noChangeArrowheads="1" noChangeShapeType="1" noTextEdit="1"/>
+              </p:cNvSpPr>
+              <p:nvPr>
+                <p:ph idx="1"/>
+              </p:nvPr>
+            </p:nvSpPr>
+            <p:spPr>
+              <a:xfrm>
+                <a:off x="195649" y="1160803"/>
+                <a:ext cx="8149282" cy="5016160"/>
+              </a:xfrm>
+              <a:blipFill rotWithShape="0">
+                <a:blip r:embed="rId2"/>
+                <a:stretch>
+                  <a:fillRect t="-851" b="-11543"/>
+                </a:stretch>
+              </a:blipFill>
+            </p:spPr>
+            <p:txBody>
+              <a:bodyPr/>
+              <a:lstStyle/>
+              <a:p>
+                <a:r>
+                  <a:rPr lang="en-GB">
+                    <a:noFill/>
+                  </a:rPr>
+                  <a:t> </a:t>
+                </a:r>
+              </a:p>
+            </p:txBody>
+          </p:sp>
+        </mc:Fallback>
+      </mc:AlternateContent>
+      <mc:AlternateContent xmlns:mc="http://schemas.openxmlformats.org/markup-compatibility/2006">
+        <mc:Choice xmlns:a14="http://schemas.microsoft.com/office/drawing/2010/main" Requires="a14">
+          <p:sp>
+            <p:nvSpPr>
+              <p:cNvPr id="6" name="TextBox 5"/>
+              <p:cNvSpPr txBox="1"/>
+              <p:nvPr/>
+            </p:nvSpPr>
+            <p:spPr>
+              <a:xfrm>
+                <a:off x="8443784" y="1160803"/>
+                <a:ext cx="3649362" cy="2123658"/>
+              </a:xfrm>
+              <a:prstGeom prst="rect">
+                <a:avLst/>
+              </a:prstGeom>
+              <a:noFill/>
+            </p:spPr>
+            <p:txBody>
+              <a:bodyPr wrap="square" rtlCol="0">
+                <a:spAutoFit/>
+              </a:bodyPr>
+              <a:lstStyle/>
+              <a:p>
+                <a:pPr algn="ctr"/>
+                <a14:m>
+                  <m:oMath xmlns:m="http://schemas.openxmlformats.org/officeDocument/2006/math">
+                    <m:sSub>
+                      <m:sSubPr>
+                        <m:ctrlPr>
+                          <a:rPr lang="en-GB" sz="1600" i="1" dirty="0" smtClean="0">
+                            <a:latin typeface="Cambria Math" panose="02040503050406030204" pitchFamily="18" charset="0"/>
+                            <a:cs typeface="Times New Roman" panose="02020603050405020304" pitchFamily="18" charset="0"/>
+                          </a:rPr>
+                        </m:ctrlPr>
+                      </m:sSubPr>
+                      <m:e>
+                        <m:r>
+                          <a:rPr lang="en-GB" sz="1600" i="1" dirty="0">
+                            <a:latin typeface="Cambria Math" panose="02040503050406030204" pitchFamily="18" charset="0"/>
+                            <a:cs typeface="Times New Roman" panose="02020603050405020304" pitchFamily="18" charset="0"/>
+                          </a:rPr>
+                          <m:t>𝐻</m:t>
+                        </m:r>
+                      </m:e>
+                      <m:sub>
+                        <m:r>
+                          <a:rPr lang="en-GB" sz="1600" i="1" dirty="0">
+                            <a:latin typeface="Cambria Math" panose="02040503050406030204" pitchFamily="18" charset="0"/>
+                            <a:cs typeface="Times New Roman" panose="02020603050405020304" pitchFamily="18" charset="0"/>
+                          </a:rPr>
+                          <m:t>𝑏</m:t>
+                        </m:r>
+                      </m:sub>
+                    </m:sSub>
+                  </m:oMath>
+                </a14:m>
+                <a:r>
+                  <a:rPr lang="en-GB" sz="1600" dirty="0" smtClean="0">
+                    <a:latin typeface="Times New Roman" panose="02020603050405020304" pitchFamily="18" charset="0"/>
+                    <a:cs typeface="Times New Roman" panose="02020603050405020304" pitchFamily="18" charset="0"/>
+                  </a:rPr>
+                  <a:t>= Height above sea level</a:t>
+                </a:r>
+              </a:p>
+              <a:p>
+                <a:pPr algn="ctr"/>
+                <a:r>
+                  <a:rPr lang="en-GB" sz="1600" dirty="0" smtClean="0">
+                    <a:latin typeface="Times New Roman" panose="02020603050405020304" pitchFamily="18" charset="0"/>
+                    <a:cs typeface="Times New Roman" panose="02020603050405020304" pitchFamily="18" charset="0"/>
+                  </a:rPr>
+                  <a:t>H = Height of plane</a:t>
+                </a:r>
+              </a:p>
+              <a:p>
+                <a:pPr algn="ctr"/>
+                <a14:m>
+                  <m:oMath xmlns:m="http://schemas.openxmlformats.org/officeDocument/2006/math">
+                    <m:sSub>
+                      <m:sSubPr>
+                        <m:ctrlPr>
+                          <a:rPr lang="en-GB" sz="1600" i="1">
+                            <a:latin typeface="Cambria Math" panose="02040503050406030204" pitchFamily="18" charset="0"/>
+                            <a:cs typeface="Times New Roman" panose="02020603050405020304" pitchFamily="18" charset="0"/>
+                          </a:rPr>
+                        </m:ctrlPr>
+                      </m:sSubPr>
+                      <m:e>
+                        <m:r>
+                          <a:rPr lang="en-GB" sz="1600" i="1">
+                            <a:latin typeface="Cambria Math" panose="02040503050406030204" pitchFamily="18" charset="0"/>
+                            <a:cs typeface="Times New Roman" panose="02020603050405020304" pitchFamily="18" charset="0"/>
+                          </a:rPr>
+                          <m:t>𝑇</m:t>
+                        </m:r>
+                      </m:e>
+                      <m:sub>
+                        <m:r>
+                          <a:rPr lang="en-GB" sz="1600" i="1">
+                            <a:latin typeface="Cambria Math" panose="02040503050406030204" pitchFamily="18" charset="0"/>
+                            <a:cs typeface="Times New Roman" panose="02020603050405020304" pitchFamily="18" charset="0"/>
+                          </a:rPr>
+                          <m:t>𝑏</m:t>
+                        </m:r>
+                      </m:sub>
+                    </m:sSub>
+                  </m:oMath>
+                </a14:m>
+                <a:r>
+                  <a:rPr lang="en-GB" sz="1600" dirty="0" smtClean="0">
+                    <a:latin typeface="Times New Roman" panose="02020603050405020304" pitchFamily="18" charset="0"/>
+                    <a:cs typeface="Times New Roman" panose="02020603050405020304" pitchFamily="18" charset="0"/>
+                  </a:rPr>
+                  <a:t> = </a:t>
+                </a:r>
+                <a:r>
+                  <a:rPr lang="en-GB" sz="1600" dirty="0" smtClean="0">
+                    <a:latin typeface="Times New Roman" panose="02020603050405020304" pitchFamily="18" charset="0"/>
+                    <a:cs typeface="Times New Roman" panose="02020603050405020304" pitchFamily="18" charset="0"/>
+                  </a:rPr>
+                  <a:t>Sea level </a:t>
+                </a:r>
+                <a:r>
+                  <a:rPr lang="en-GB" sz="1600" dirty="0">
+                    <a:latin typeface="Times New Roman" panose="02020603050405020304" pitchFamily="18" charset="0"/>
+                    <a:cs typeface="Times New Roman" panose="02020603050405020304" pitchFamily="18" charset="0"/>
+                  </a:rPr>
+                  <a:t>t</a:t>
+                </a:r>
+                <a:r>
+                  <a:rPr lang="en-GB" sz="1600" dirty="0" smtClean="0">
+                    <a:latin typeface="Times New Roman" panose="02020603050405020304" pitchFamily="18" charset="0"/>
+                    <a:cs typeface="Times New Roman" panose="02020603050405020304" pitchFamily="18" charset="0"/>
+                  </a:rPr>
+                  <a:t>emperature</a:t>
+                </a:r>
+                <a:endParaRPr lang="en-GB" sz="1600" dirty="0" smtClean="0">
+                  <a:latin typeface="Times New Roman" panose="02020603050405020304" pitchFamily="18" charset="0"/>
+                  <a:cs typeface="Times New Roman" panose="02020603050405020304" pitchFamily="18" charset="0"/>
+                </a:endParaRPr>
+              </a:p>
+              <a:p>
+                <a:pPr algn="ctr"/>
+                <a14:m>
+                  <m:oMath xmlns:m="http://schemas.openxmlformats.org/officeDocument/2006/math">
+                    <m:sSub>
+                      <m:sSubPr>
+                        <m:ctrlPr>
+                          <a:rPr lang="en-GB" sz="1600" i="1">
+                            <a:latin typeface="Cambria Math" panose="02040503050406030204" pitchFamily="18" charset="0"/>
+                            <a:cs typeface="Times New Roman" panose="02020603050405020304" pitchFamily="18" charset="0"/>
+                          </a:rPr>
+                        </m:ctrlPr>
+                      </m:sSubPr>
+                      <m:e>
+                        <m:r>
+                          <a:rPr lang="en-GB" sz="1600" i="1">
+                            <a:latin typeface="Cambria Math" panose="02040503050406030204" pitchFamily="18" charset="0"/>
+                            <a:cs typeface="Times New Roman" panose="02020603050405020304" pitchFamily="18" charset="0"/>
+                          </a:rPr>
+                          <m:t>𝑀</m:t>
+                        </m:r>
+                      </m:e>
+                      <m:sub>
+                        <m:r>
+                          <a:rPr lang="en-GB" sz="1600" i="1">
+                            <a:latin typeface="Cambria Math" panose="02040503050406030204" pitchFamily="18" charset="0"/>
+                            <a:cs typeface="Times New Roman" panose="02020603050405020304" pitchFamily="18" charset="0"/>
+                          </a:rPr>
+                          <m:t>0</m:t>
+                        </m:r>
+                      </m:sub>
+                    </m:sSub>
+                  </m:oMath>
+                </a14:m>
+                <a:r>
+                  <a:rPr lang="en-GB" sz="1600" dirty="0" smtClean="0">
+                    <a:latin typeface="Times New Roman" panose="02020603050405020304" pitchFamily="18" charset="0"/>
+                    <a:cs typeface="Times New Roman" panose="02020603050405020304" pitchFamily="18" charset="0"/>
+                  </a:rPr>
+                  <a:t>= Molar mass of air</a:t>
+                </a:r>
+              </a:p>
+              <a:p>
+                <a:pPr algn="ctr"/>
+                <a:r>
+                  <a:rPr lang="en-GB" sz="1600" dirty="0" smtClean="0">
+                    <a:latin typeface="Times New Roman" panose="02020603050405020304" pitchFamily="18" charset="0"/>
+                    <a:cs typeface="Times New Roman" panose="02020603050405020304" pitchFamily="18" charset="0"/>
+                  </a:rPr>
+                  <a:t>R = Gas constant</a:t>
+                </a:r>
+              </a:p>
+              <a:p>
+                <a:pPr algn="ctr"/>
+                <a:r>
+                  <a:rPr lang="en-GB" sz="1600" dirty="0" smtClean="0">
+                    <a:latin typeface="Times New Roman" panose="02020603050405020304" pitchFamily="18" charset="0"/>
+                    <a:cs typeface="Times New Roman" panose="02020603050405020304" pitchFamily="18" charset="0"/>
+                  </a:rPr>
+                  <a:t>g = </a:t>
+                </a:r>
+                <a:r>
+                  <a:rPr lang="en-GB" sz="1600" dirty="0" err="1" smtClean="0">
+                    <a:latin typeface="Times New Roman" panose="02020603050405020304" pitchFamily="18" charset="0"/>
+                    <a:cs typeface="Times New Roman" panose="02020603050405020304" pitchFamily="18" charset="0"/>
+                  </a:rPr>
+                  <a:t>Accleration</a:t>
+                </a:r>
+                <a:r>
+                  <a:rPr lang="en-GB" sz="1600" dirty="0" smtClean="0">
+                    <a:latin typeface="Times New Roman" panose="02020603050405020304" pitchFamily="18" charset="0"/>
+                    <a:cs typeface="Times New Roman" panose="02020603050405020304" pitchFamily="18" charset="0"/>
+                  </a:rPr>
+                  <a:t> due to gravity</a:t>
+                </a:r>
+              </a:p>
+              <a:p>
+                <a:pPr algn="ctr"/>
+                <a:r>
+                  <a:rPr lang="en-GB" sz="1600" dirty="0" err="1" smtClean="0">
+                    <a:latin typeface="Times New Roman" panose="02020603050405020304" pitchFamily="18" charset="0"/>
+                    <a:cs typeface="Times New Roman" panose="02020603050405020304" pitchFamily="18" charset="0"/>
+                  </a:rPr>
+                  <a:t>P</a:t>
+                </a:r>
+                <a:r>
+                  <a:rPr lang="en-GB" sz="1600" baseline="-25000" dirty="0" err="1" smtClean="0">
+                    <a:latin typeface="Times New Roman" panose="02020603050405020304" pitchFamily="18" charset="0"/>
+                    <a:cs typeface="Times New Roman" panose="02020603050405020304" pitchFamily="18" charset="0"/>
+                  </a:rPr>
+                  <a:t>b</a:t>
+                </a:r>
+                <a:r>
+                  <a:rPr lang="en-GB" sz="1600" dirty="0" smtClean="0">
+                    <a:latin typeface="Times New Roman" panose="02020603050405020304" pitchFamily="18" charset="0"/>
+                    <a:cs typeface="Times New Roman" panose="02020603050405020304" pitchFamily="18" charset="0"/>
+                  </a:rPr>
+                  <a:t>= Sea level pressure</a:t>
+                </a:r>
+              </a:p>
+              <a:p>
+                <a:pPr algn="ctr"/>
+                <a14:m>
+                  <m:oMath xmlns:m="http://schemas.openxmlformats.org/officeDocument/2006/math">
+                    <m:r>
+                      <a:rPr lang="en-GB" sz="1600" i="1" smtClean="0">
+                        <a:latin typeface="Cambria Math" panose="02040503050406030204" pitchFamily="18" charset="0"/>
+                        <a:ea typeface="Cambria Math" panose="02040503050406030204" pitchFamily="18" charset="0"/>
+                        <a:cs typeface="Times New Roman" panose="02020603050405020304" pitchFamily="18" charset="0"/>
+                      </a:rPr>
+                      <m:t>𝛽</m:t>
+                    </m:r>
+                  </m:oMath>
+                </a14:m>
+                <a:r>
+                  <a:rPr lang="en-GB" sz="1600" dirty="0" smtClean="0">
+                    <a:latin typeface="Times New Roman" panose="02020603050405020304" pitchFamily="18" charset="0"/>
+                    <a:cs typeface="Times New Roman" panose="02020603050405020304" pitchFamily="18" charset="0"/>
+                  </a:rPr>
+                  <a:t> = Temperature gradient -6.5Kkm</a:t>
+                </a:r>
+                <a:r>
+                  <a:rPr lang="en-GB" sz="1600" baseline="30000" dirty="0" smtClean="0">
+                    <a:latin typeface="Times New Roman" panose="02020603050405020304" pitchFamily="18" charset="0"/>
+                    <a:cs typeface="Times New Roman" panose="02020603050405020304" pitchFamily="18" charset="0"/>
+                  </a:rPr>
+                  <a:t>-1</a:t>
+                </a:r>
+                <a:endParaRPr lang="en-GB" sz="1600" dirty="0">
+                  <a:latin typeface="Times New Roman" panose="02020603050405020304" pitchFamily="18" charset="0"/>
+                  <a:cs typeface="Times New Roman" panose="02020603050405020304" pitchFamily="18" charset="0"/>
+                </a:endParaRPr>
+              </a:p>
+            </p:txBody>
+          </p:sp>
+        </mc:Choice>
+        <mc:Fallback>
+          <p:sp>
+            <p:nvSpPr>
+              <p:cNvPr id="6" name="TextBox 5"/>
+              <p:cNvSpPr txBox="1">
+                <a:spLocks noRot="1" noChangeAspect="1" noMove="1" noResize="1" noEditPoints="1" noAdjustHandles="1" noChangeArrowheads="1" noChangeShapeType="1" noTextEdit="1"/>
+              </p:cNvSpPr>
+              <p:nvPr/>
+            </p:nvSpPr>
+            <p:spPr>
+              <a:xfrm>
+                <a:off x="8443784" y="1160803"/>
+                <a:ext cx="3649362" cy="2123658"/>
+              </a:xfrm>
+              <a:prstGeom prst="rect">
+                <a:avLst/>
+              </a:prstGeom>
+              <a:blipFill rotWithShape="0">
+                <a:blip r:embed="rId3"/>
+                <a:stretch>
+                  <a:fillRect t="-860"/>
+                </a:stretch>
+              </a:blipFill>
+            </p:spPr>
+            <p:txBody>
+              <a:bodyPr/>
+              <a:lstStyle/>
+              <a:p>
+                <a:r>
+                  <a:rPr lang="en-GB">
+                    <a:noFill/>
+                  </a:rPr>
+                  <a:t> </a:t>
+                </a:r>
+              </a:p>
+            </p:txBody>
+          </p:sp>
+        </mc:Fallback>
+      </mc:AlternateContent>
+    </p:spTree>
+    <p:extLst>
+      <p:ext uri="{BB962C8B-B14F-4D97-AF65-F5344CB8AC3E}">
+        <p14:creationId xmlns:p14="http://schemas.microsoft.com/office/powerpoint/2010/main" val="2192910003"/>
+      </p:ext>
+    </p:extLst>
+  </p:cSld>
+  <p:clrMapOvr>
+    <a:masterClrMapping/>
+  </p:clrMapOvr>
+  <p:timing>
+    <p:tnLst>
+      <p:par>
+        <p:cTn id="1" dur="indefinite" restart="never" nodeType="tmRoot">
+          <p:childTnLst>
+            <p:seq concurrent="1" nextAc="seek">
+              <p:cTn id="2" dur="indefinite" nodeType="mainSeq">
+                <p:childTnLst>
+                  <p:par>
+                    <p:cTn id="3" fill="hold">
+                      <p:stCondLst>
+                        <p:cond delay="indefinite"/>
+                      </p:stCondLst>
+                      <p:childTnLst>
+                        <p:par>
+                          <p:cTn id="4" fill="hold">
+                            <p:stCondLst>
+                              <p:cond delay="0"/>
+                            </p:stCondLst>
+                            <p:childTnLst>
+                              <p:par>
+                                <p:cTn id="5" presetID="10" presetClass="entr" presetSubtype="0" fill="hold" grpId="0" nodeType="clickEffect">
+                                  <p:stCondLst>
+                                    <p:cond delay="0"/>
+                                  </p:stCondLst>
+                                  <p:childTnLst>
+                                    <p:set>
+                                      <p:cBhvr>
+                                        <p:cTn id="6" dur="1" fill="hold">
+                                          <p:stCondLst>
+                                            <p:cond delay="0"/>
+                                          </p:stCondLst>
+                                        </p:cTn>
+                                        <p:tgtEl>
+                                          <p:spTgt spid="4"/>
+                                        </p:tgtEl>
+                                        <p:attrNameLst>
+                                          <p:attrName>style.visibility</p:attrName>
+                                        </p:attrNameLst>
+                                      </p:cBhvr>
+                                      <p:to>
+                                        <p:strVal val="visible"/>
+                                      </p:to>
+                                    </p:set>
+                                    <p:animEffect transition="in" filter="fade">
+                                      <p:cBhvr>
+                                        <p:cTn id="7" dur="500"/>
+                                        <p:tgtEl>
+                                          <p:spTgt spid="4"/>
+                                        </p:tgtEl>
+                                      </p:cBhvr>
+                                    </p:animEffect>
+                                  </p:childTnLst>
+                                </p:cTn>
+                              </p:par>
+                            </p:childTnLst>
+                          </p:cTn>
+                        </p:par>
+                      </p:childTnLst>
+                    </p:cTn>
+                  </p:par>
+                  <p:par>
+                    <p:cTn id="8" fill="hold">
+                      <p:stCondLst>
+                        <p:cond delay="indefinite"/>
+                      </p:stCondLst>
+                      <p:childTnLst>
+                        <p:par>
+                          <p:cTn id="9" fill="hold">
+                            <p:stCondLst>
+                              <p:cond delay="0"/>
+                            </p:stCondLst>
+                            <p:childTnLst>
+                              <p:par>
+                                <p:cTn id="10" presetID="10" presetClass="entr" presetSubtype="0" fill="hold" grpId="0" nodeType="clickEffect">
+                                  <p:stCondLst>
+                                    <p:cond delay="0"/>
+                                  </p:stCondLst>
+                                  <p:childTnLst>
+                                    <p:set>
+                                      <p:cBhvr>
+                                        <p:cTn id="11" dur="1" fill="hold">
+                                          <p:stCondLst>
+                                            <p:cond delay="0"/>
+                                          </p:stCondLst>
+                                        </p:cTn>
+                                        <p:tgtEl>
+                                          <p:spTgt spid="5"/>
+                                        </p:tgtEl>
+                                        <p:attrNameLst>
+                                          <p:attrName>style.visibility</p:attrName>
+                                        </p:attrNameLst>
+                                      </p:cBhvr>
+                                      <p:to>
+                                        <p:strVal val="visible"/>
+                                      </p:to>
+                                    </p:set>
+                                    <p:animEffect transition="in" filter="fade">
+                                      <p:cBhvr>
+                                        <p:cTn id="12" dur="500"/>
+                                        <p:tgtEl>
+                                          <p:spTgt spid="5"/>
+                                        </p:tgtEl>
+                                      </p:cBhvr>
+                                    </p:animEffect>
+                                  </p:childTnLst>
+                                </p:cTn>
+                              </p:par>
+                              <p:par>
+                                <p:cTn id="13" presetID="10" presetClass="entr" presetSubtype="0" fill="hold" grpId="0" nodeType="withEffect">
+                                  <p:stCondLst>
+                                    <p:cond delay="0"/>
+                                  </p:stCondLst>
+                                  <p:childTnLst>
+                                    <p:set>
+                                      <p:cBhvr>
+                                        <p:cTn id="14" dur="1" fill="hold">
+                                          <p:stCondLst>
+                                            <p:cond delay="0"/>
+                                          </p:stCondLst>
+                                        </p:cTn>
+                                        <p:tgtEl>
+                                          <p:spTgt spid="6"/>
+                                        </p:tgtEl>
+                                        <p:attrNameLst>
+                                          <p:attrName>style.visibility</p:attrName>
+                                        </p:attrNameLst>
+                                      </p:cBhvr>
+                                      <p:to>
+                                        <p:strVal val="visible"/>
+                                      </p:to>
+                                    </p:set>
+                                    <p:animEffect transition="in" filter="fade">
+                                      <p:cBhvr>
+                                        <p:cTn id="15" dur="500"/>
+                                        <p:tgtEl>
+                                          <p:spTgt spid="6"/>
+                                        </p:tgtEl>
+                                      </p:cBhvr>
+                                    </p:animEffect>
+                                  </p:childTnLst>
+                                </p:cTn>
+                              </p:par>
+                            </p:childTnLst>
+                          </p:cTn>
+                        </p:par>
+                      </p:childTnLst>
+                    </p:cTn>
+                  </p:par>
+                </p:childTnLst>
+              </p:cTn>
+              <p:prevCondLst>
+                <p:cond evt="onPrev" delay="0">
+                  <p:tgtEl>
+                    <p:sldTgt/>
+                  </p:tgtEl>
+                </p:cond>
+              </p:prevCondLst>
+              <p:nextCondLst>
+                <p:cond evt="onNext" delay="0">
+                  <p:tgtEl>
+                    <p:sldTgt/>
+                  </p:tgtEl>
+                </p:cond>
+              </p:nextCondLst>
+            </p:seq>
+          </p:childTnLst>
+        </p:cTn>
+      </p:par>
+    </p:tnLst>
+    <p:bldLst>
+      <p:bldP spid="4" grpId="0"/>
+      <p:bldP spid="5" grpId="0"/>
+      <p:bldP spid="6" grpId="0"/>
+    </p:bldLst>
+  </p:timing>
+</p:sld>
+</file>
+
+<file path=ppt/slides/slide13.xml><?xml version="1.0" encoding="utf-8"?>
+<p:sld xmlns:a="http://schemas.openxmlformats.org/drawingml/2006/main" xmlns:r="http://schemas.openxmlformats.org/officeDocument/2006/relationships" xmlns:p="http://schemas.openxmlformats.org/presentationml/2006/main">
+  <p:cSld>
+    <p:spTree>
+      <p:nvGrpSpPr>
+        <p:cNvPr id="1" name=""/>
+        <p:cNvGrpSpPr/>
+        <p:nvPr/>
+      </p:nvGrpSpPr>
+      <p:grpSpPr>
+        <a:xfrm>
+          <a:off x="0" y="0"/>
+          <a:ext cx="0" cy="0"/>
+          <a:chOff x="0" y="0"/>
+          <a:chExt cx="0" cy="0"/>
+        </a:xfrm>
+      </p:grpSpPr>
+      <p:sp>
+        <p:nvSpPr>
+          <p:cNvPr id="3" name="Content Placeholder 2"/>
+          <p:cNvSpPr>
+            <a:spLocks noGrp="1"/>
+          </p:cNvSpPr>
+          <p:nvPr>
+            <p:ph idx="1"/>
+          </p:nvPr>
+        </p:nvSpPr>
+        <p:spPr/>
+        <p:txBody>
+          <a:bodyPr/>
+          <a:lstStyle/>
+          <a:p>
+            <a:pPr marL="0" indent="0">
+              <a:buNone/>
+            </a:pPr>
+            <a:r>
+              <a:rPr lang="en-GB" baseline="30000" dirty="0" smtClean="0">
+                <a:latin typeface="Times New Roman" panose="02020603050405020304" pitchFamily="18" charset="0"/>
+                <a:cs typeface="Times New Roman" panose="02020603050405020304" pitchFamily="18" charset="0"/>
+              </a:rPr>
+              <a:t>1</a:t>
+            </a:r>
+            <a:r>
+              <a:rPr lang="en-GB" dirty="0" smtClean="0">
+                <a:latin typeface="Times New Roman" panose="02020603050405020304" pitchFamily="18" charset="0"/>
+                <a:cs typeface="Times New Roman" panose="02020603050405020304" pitchFamily="18" charset="0"/>
+              </a:rPr>
+              <a:t> Mangum, J &amp; Wallace, P, 2015, Atmospheric Refractive Electromagnetic Wave Bending and Propagation Delay, Publications of the Astronomical Society of the Pacific, Vol.127, </a:t>
+            </a:r>
+            <a:r>
+              <a:rPr lang="en-GB" dirty="0" err="1" smtClean="0">
+                <a:latin typeface="Times New Roman" panose="02020603050405020304" pitchFamily="18" charset="0"/>
+                <a:cs typeface="Times New Roman" panose="02020603050405020304" pitchFamily="18" charset="0"/>
+              </a:rPr>
+              <a:t>pg</a:t>
+            </a:r>
+            <a:r>
+              <a:rPr lang="en-GB" dirty="0" smtClean="0">
+                <a:latin typeface="Times New Roman" panose="02020603050405020304" pitchFamily="18" charset="0"/>
+                <a:cs typeface="Times New Roman" panose="02020603050405020304" pitchFamily="18" charset="0"/>
+              </a:rPr>
+              <a:t> 74 – 91.</a:t>
+            </a:r>
+          </a:p>
+          <a:p>
+            <a:pPr marL="0" indent="0">
+              <a:buNone/>
+            </a:pPr>
+            <a:r>
+              <a:rPr lang="en-GB" baseline="30000" dirty="0">
+                <a:latin typeface="Times New Roman" panose="02020603050405020304" pitchFamily="18" charset="0"/>
+                <a:cs typeface="Times New Roman" panose="02020603050405020304" pitchFamily="18" charset="0"/>
+              </a:rPr>
+              <a:t>2</a:t>
+            </a:r>
+            <a:r>
+              <a:rPr lang="en-GB" dirty="0" smtClean="0">
+                <a:latin typeface="Times New Roman" panose="02020603050405020304" pitchFamily="18" charset="0"/>
+                <a:cs typeface="Times New Roman" panose="02020603050405020304" pitchFamily="18" charset="0"/>
+              </a:rPr>
+              <a:t> 1993 Manual of the ICAO Standard Atmosphere, Third Edition, pages 7 -14.</a:t>
+            </a:r>
+          </a:p>
+          <a:p>
+            <a:pPr marL="0" indent="0">
+              <a:buNone/>
+            </a:pPr>
+            <a:r>
+              <a:rPr lang="en-GB" baseline="30000" dirty="0" smtClean="0">
+                <a:latin typeface="Times New Roman" panose="02020603050405020304" pitchFamily="18" charset="0"/>
+                <a:cs typeface="Times New Roman" panose="02020603050405020304" pitchFamily="18" charset="0"/>
+              </a:rPr>
+              <a:t>3</a:t>
+            </a:r>
+            <a:r>
+              <a:rPr lang="en-GB" dirty="0" smtClean="0">
+                <a:latin typeface="Times New Roman" panose="02020603050405020304" pitchFamily="18" charset="0"/>
+                <a:cs typeface="Times New Roman" panose="02020603050405020304" pitchFamily="18" charset="0"/>
+              </a:rPr>
+              <a:t> Buck, A.L, 1981, New Equations for Computing </a:t>
+            </a:r>
+            <a:r>
+              <a:rPr lang="en-GB" dirty="0" err="1" smtClean="0">
+                <a:latin typeface="Times New Roman" panose="02020603050405020304" pitchFamily="18" charset="0"/>
+                <a:cs typeface="Times New Roman" panose="02020603050405020304" pitchFamily="18" charset="0"/>
+              </a:rPr>
+              <a:t>Vapor</a:t>
+            </a:r>
+            <a:r>
+              <a:rPr lang="en-GB" dirty="0" smtClean="0">
+                <a:latin typeface="Times New Roman" panose="02020603050405020304" pitchFamily="18" charset="0"/>
+                <a:cs typeface="Times New Roman" panose="02020603050405020304" pitchFamily="18" charset="0"/>
+              </a:rPr>
+              <a:t> Pressure and Enhancement Factor, National </a:t>
+            </a:r>
+            <a:r>
+              <a:rPr lang="en-GB" dirty="0" err="1" smtClean="0">
+                <a:latin typeface="Times New Roman" panose="02020603050405020304" pitchFamily="18" charset="0"/>
+                <a:cs typeface="Times New Roman" panose="02020603050405020304" pitchFamily="18" charset="0"/>
+              </a:rPr>
+              <a:t>Center</a:t>
+            </a:r>
+            <a:r>
+              <a:rPr lang="en-GB" dirty="0" smtClean="0">
+                <a:latin typeface="Times New Roman" panose="02020603050405020304" pitchFamily="18" charset="0"/>
+                <a:cs typeface="Times New Roman" panose="02020603050405020304" pitchFamily="18" charset="0"/>
+              </a:rPr>
+              <a:t> for </a:t>
+            </a:r>
+            <a:r>
+              <a:rPr lang="en-GB" dirty="0" err="1" smtClean="0">
+                <a:latin typeface="Times New Roman" panose="02020603050405020304" pitchFamily="18" charset="0"/>
+                <a:cs typeface="Times New Roman" panose="02020603050405020304" pitchFamily="18" charset="0"/>
+              </a:rPr>
+              <a:t>Atomspheric</a:t>
+            </a:r>
+            <a:r>
+              <a:rPr lang="en-GB" dirty="0" smtClean="0">
+                <a:latin typeface="Times New Roman" panose="02020603050405020304" pitchFamily="18" charset="0"/>
+                <a:cs typeface="Times New Roman" panose="02020603050405020304" pitchFamily="18" charset="0"/>
+              </a:rPr>
+              <a:t> Research, Vol 20, pages 1527 – 1532.</a:t>
+            </a:r>
+            <a:endParaRPr lang="en-GB" dirty="0">
+              <a:latin typeface="Times New Roman" panose="02020603050405020304" pitchFamily="18" charset="0"/>
+              <a:cs typeface="Times New Roman" panose="02020603050405020304" pitchFamily="18" charset="0"/>
+            </a:endParaRPr>
+          </a:p>
+          <a:p>
+            <a:pPr marL="0" indent="0">
+              <a:buNone/>
+            </a:pPr>
+            <a:endParaRPr lang="en-GB" baseline="30000" dirty="0"/>
+          </a:p>
+        </p:txBody>
+      </p:sp>
+      <p:sp>
+        <p:nvSpPr>
+          <p:cNvPr id="4" name="Title 1"/>
+          <p:cNvSpPr txBox="1">
+            <a:spLocks noGrp="1"/>
+          </p:cNvSpPr>
+          <p:nvPr>
+            <p:ph type="title"/>
+          </p:nvPr>
+        </p:nvSpPr>
+        <p:spPr>
+          <a:xfrm>
+            <a:off x="838200" y="74138"/>
+            <a:ext cx="10515600" cy="1111379"/>
+          </a:xfrm>
+          <a:prstGeom prst="rect">
+            <a:avLst/>
+          </a:prstGeom>
+        </p:spPr>
+        <p:txBody>
+          <a:bodyPr vert="horz" lIns="91440" tIns="45720" rIns="91440" bIns="45720" rtlCol="0" anchor="b">
+            <a:normAutofit/>
+          </a:bodyPr>
+          <a:lstStyle>
+            <a:lvl1pPr algn="ctr" defTabSz="914400" rtl="0" eaLnBrk="1" latinLnBrk="0" hangingPunct="1">
+              <a:lnSpc>
+                <a:spcPct val="90000"/>
+              </a:lnSpc>
+              <a:spcBef>
+                <a:spcPct val="0"/>
+              </a:spcBef>
+              <a:buNone/>
+              <a:defRPr sz="6000" kern="1200">
+                <a:solidFill>
+                  <a:schemeClr val="tx1"/>
+                </a:solidFill>
+                <a:latin typeface="+mj-lt"/>
+                <a:ea typeface="+mj-ea"/>
+                <a:cs typeface="+mj-cs"/>
+              </a:defRPr>
+            </a:lvl1pPr>
+          </a:lstStyle>
+          <a:p>
+            <a:r>
+              <a:rPr lang="en-GB" sz="4800" dirty="0" smtClean="0">
+                <a:latin typeface="Times New Roman" panose="02020603050405020304" pitchFamily="18" charset="0"/>
+                <a:cs typeface="Times New Roman" panose="02020603050405020304" pitchFamily="18" charset="0"/>
+              </a:rPr>
+              <a:t>Refraction – </a:t>
+            </a:r>
+            <a:r>
+              <a:rPr lang="en-GB" sz="4800" dirty="0" smtClean="0">
+                <a:latin typeface="Times New Roman" panose="02020603050405020304" pitchFamily="18" charset="0"/>
+                <a:cs typeface="Times New Roman" panose="02020603050405020304" pitchFamily="18" charset="0"/>
+              </a:rPr>
+              <a:t>References</a:t>
+            </a:r>
+            <a:endParaRPr lang="en-GB" sz="4800" dirty="0">
+              <a:latin typeface="Times New Roman" panose="02020603050405020304" pitchFamily="18" charset="0"/>
+              <a:cs typeface="Times New Roman" panose="02020603050405020304" pitchFamily="18" charset="0"/>
+            </a:endParaRPr>
+          </a:p>
+        </p:txBody>
+      </p:sp>
+    </p:spTree>
+    <p:extLst>
+      <p:ext uri="{BB962C8B-B14F-4D97-AF65-F5344CB8AC3E}">
+        <p14:creationId xmlns:p14="http://schemas.microsoft.com/office/powerpoint/2010/main" val="270944767"/>
+      </p:ext>
+    </p:extLst>
+  </p:cSld>
+  <p:clrMapOvr>
+    <a:masterClrMapping/>
+  </p:clrMapOvr>
+  <p:timing>
+    <p:tnLst>
+      <p:par>
+        <p:cTn id="1" dur="indefinite" restart="never" nodeType="tmRoot">
+          <p:childTnLst>
+            <p:seq concurrent="1" nextAc="seek">
+              <p:cTn id="2" dur="indefinite" nodeType="mainSeq">
+                <p:childTnLst>
+                  <p:par>
+                    <p:cTn id="3" fill="hold">
+                      <p:stCondLst>
+                        <p:cond delay="indefinite"/>
+                      </p:stCondLst>
+                      <p:childTnLst>
+                        <p:par>
+                          <p:cTn id="4" fill="hold">
+                            <p:stCondLst>
+                              <p:cond delay="0"/>
+                            </p:stCondLst>
+                            <p:childTnLst>
+                              <p:par>
+                                <p:cTn id="5" presetID="10" presetClass="entr" presetSubtype="0" fill="hold" grpId="0" nodeType="clickEffect">
+                                  <p:stCondLst>
+                                    <p:cond delay="0"/>
+                                  </p:stCondLst>
+                                  <p:childTnLst>
+                                    <p:set>
+                                      <p:cBhvr>
+                                        <p:cTn id="6" dur="1" fill="hold">
+                                          <p:stCondLst>
+                                            <p:cond delay="0"/>
+                                          </p:stCondLst>
+                                        </p:cTn>
+                                        <p:tgtEl>
+                                          <p:spTgt spid="4"/>
+                                        </p:tgtEl>
+                                        <p:attrNameLst>
+                                          <p:attrName>style.visibility</p:attrName>
+                                        </p:attrNameLst>
+                                      </p:cBhvr>
+                                      <p:to>
+                                        <p:strVal val="visible"/>
+                                      </p:to>
+                                    </p:set>
+                                    <p:animEffect transition="in" filter="fade">
+                                      <p:cBhvr>
+                                        <p:cTn id="7" dur="500"/>
+                                        <p:tgtEl>
+                                          <p:spTgt spid="4"/>
+                                        </p:tgtEl>
+                                      </p:cBhvr>
+                                    </p:animEffect>
+                                  </p:childTnLst>
+                                </p:cTn>
+                              </p:par>
+                            </p:childTnLst>
+                          </p:cTn>
+                        </p:par>
+                      </p:childTnLst>
+                    </p:cTn>
+                  </p:par>
+                  <p:par>
+                    <p:cTn id="8" fill="hold">
+                      <p:stCondLst>
+                        <p:cond delay="indefinite"/>
+                      </p:stCondLst>
+                      <p:childTnLst>
+                        <p:par>
+                          <p:cTn id="9" fill="hold">
+                            <p:stCondLst>
+                              <p:cond delay="0"/>
+                            </p:stCondLst>
+                            <p:childTnLst>
+                              <p:par>
+                                <p:cTn id="10" presetID="10" presetClass="entr" presetSubtype="0" fill="hold" grpId="0" nodeType="clickEffect">
+                                  <p:stCondLst>
+                                    <p:cond delay="0"/>
+                                  </p:stCondLst>
+                                  <p:childTnLst>
+                                    <p:set>
+                                      <p:cBhvr>
+                                        <p:cTn id="11" dur="1" fill="hold">
+                                          <p:stCondLst>
+                                            <p:cond delay="0"/>
+                                          </p:stCondLst>
+                                        </p:cTn>
+                                        <p:tgtEl>
+                                          <p:spTgt spid="3">
+                                            <p:txEl>
+                                              <p:pRg st="0" end="0"/>
+                                            </p:txEl>
+                                          </p:spTgt>
+                                        </p:tgtEl>
+                                        <p:attrNameLst>
+                                          <p:attrName>style.visibility</p:attrName>
+                                        </p:attrNameLst>
+                                      </p:cBhvr>
+                                      <p:to>
+                                        <p:strVal val="visible"/>
+                                      </p:to>
+                                    </p:set>
+                                    <p:animEffect transition="in" filter="fade">
+                                      <p:cBhvr>
+                                        <p:cTn id="12" dur="500"/>
+                                        <p:tgtEl>
+                                          <p:spTgt spid="3">
+                                            <p:txEl>
+                                              <p:pRg st="0" end="0"/>
+                                            </p:txEl>
+                                          </p:spTgt>
+                                        </p:tgtEl>
+                                      </p:cBhvr>
+                                    </p:animEffect>
+                                  </p:childTnLst>
+                                </p:cTn>
+                              </p:par>
+                            </p:childTnLst>
+                          </p:cTn>
+                        </p:par>
+                      </p:childTnLst>
+                    </p:cTn>
+                  </p:par>
+                  <p:par>
+                    <p:cTn id="13" fill="hold">
+                      <p:stCondLst>
+                        <p:cond delay="indefinite"/>
+                      </p:stCondLst>
+                      <p:childTnLst>
+                        <p:par>
+                          <p:cTn id="14" fill="hold">
+                            <p:stCondLst>
+                              <p:cond delay="0"/>
+                            </p:stCondLst>
+                            <p:childTnLst>
+                              <p:par>
+                                <p:cTn id="15" presetID="10" presetClass="entr" presetSubtype="0" fill="hold" grpId="0" nodeType="clickEffect">
+                                  <p:stCondLst>
+                                    <p:cond delay="0"/>
+                                  </p:stCondLst>
+                                  <p:childTnLst>
+                                    <p:set>
+                                      <p:cBhvr>
+                                        <p:cTn id="16" dur="1" fill="hold">
+                                          <p:stCondLst>
+                                            <p:cond delay="0"/>
+                                          </p:stCondLst>
+                                        </p:cTn>
+                                        <p:tgtEl>
+                                          <p:spTgt spid="3">
+                                            <p:txEl>
+                                              <p:pRg st="1" end="1"/>
+                                            </p:txEl>
+                                          </p:spTgt>
+                                        </p:tgtEl>
+                                        <p:attrNameLst>
+                                          <p:attrName>style.visibility</p:attrName>
+                                        </p:attrNameLst>
+                                      </p:cBhvr>
+                                      <p:to>
+                                        <p:strVal val="visible"/>
+                                      </p:to>
+                                    </p:set>
+                                    <p:animEffect transition="in" filter="fade">
+                                      <p:cBhvr>
+                                        <p:cTn id="17" dur="500"/>
+                                        <p:tgtEl>
+                                          <p:spTgt spid="3">
+                                            <p:txEl>
+                                              <p:pRg st="1" end="1"/>
+                                            </p:txEl>
+                                          </p:spTgt>
+                                        </p:tgtEl>
+                                      </p:cBhvr>
+                                    </p:animEffect>
+                                  </p:childTnLst>
+                                </p:cTn>
+                              </p:par>
+                            </p:childTnLst>
+                          </p:cTn>
+                        </p:par>
+                      </p:childTnLst>
+                    </p:cTn>
+                  </p:par>
+                  <p:par>
+                    <p:cTn id="18" fill="hold">
+                      <p:stCondLst>
+                        <p:cond delay="indefinite"/>
+                      </p:stCondLst>
+                      <p:childTnLst>
+                        <p:par>
+                          <p:cTn id="19" fill="hold">
+                            <p:stCondLst>
+                              <p:cond delay="0"/>
+                            </p:stCondLst>
+                            <p:childTnLst>
+                              <p:par>
+                                <p:cTn id="20" presetID="10" presetClass="entr" presetSubtype="0" fill="hold" grpId="0" nodeType="clickEffect">
+                                  <p:stCondLst>
+                                    <p:cond delay="0"/>
+                                  </p:stCondLst>
+                                  <p:childTnLst>
+                                    <p:set>
+                                      <p:cBhvr>
+                                        <p:cTn id="21" dur="1" fill="hold">
+                                          <p:stCondLst>
+                                            <p:cond delay="0"/>
+                                          </p:stCondLst>
+                                        </p:cTn>
+                                        <p:tgtEl>
+                                          <p:spTgt spid="3">
+                                            <p:txEl>
+                                              <p:pRg st="2" end="2"/>
+                                            </p:txEl>
+                                          </p:spTgt>
+                                        </p:tgtEl>
+                                        <p:attrNameLst>
+                                          <p:attrName>style.visibility</p:attrName>
+                                        </p:attrNameLst>
+                                      </p:cBhvr>
+                                      <p:to>
+                                        <p:strVal val="visible"/>
+                                      </p:to>
+                                    </p:set>
+                                    <p:animEffect transition="in" filter="fade">
+                                      <p:cBhvr>
+                                        <p:cTn id="22" dur="500"/>
+                                        <p:tgtEl>
+                                          <p:spTgt spid="3">
+                                            <p:txEl>
+                                              <p:pRg st="2" end="2"/>
+                                            </p:txEl>
+                                          </p:spTgt>
+                                        </p:tgtEl>
+                                      </p:cBhvr>
+                                    </p:animEffect>
+                                  </p:childTnLst>
+                                </p:cTn>
+                              </p:par>
+                            </p:childTnLst>
+                          </p:cTn>
+                        </p:par>
+                      </p:childTnLst>
+                    </p:cTn>
+                  </p:par>
+                </p:childTnLst>
+              </p:cTn>
+              <p:prevCondLst>
+                <p:cond evt="onPrev" delay="0">
+                  <p:tgtEl>
+                    <p:sldTgt/>
+                  </p:tgtEl>
+                </p:cond>
+              </p:prevCondLst>
+              <p:nextCondLst>
+                <p:cond evt="onNext" delay="0">
+                  <p:tgtEl>
+                    <p:sldTgt/>
+                  </p:tgtEl>
+                </p:cond>
+              </p:nextCondLst>
+            </p:seq>
+          </p:childTnLst>
+        </p:cTn>
+      </p:par>
+    </p:tnLst>
+    <p:bldLst>
+      <p:bldP spid="3" grpId="0" build="p"/>
+      <p:bldP spid="4" grpId="0"/>
     </p:bldLst>
   </p:timing>
 </p:sld>
@@ -8807,8 +11335,8 @@
         </p:nvCxnSpPr>
         <p:spPr>
           <a:xfrm flipH="1">
-            <a:off x="2139792" y="3079148"/>
-            <a:ext cx="2044881" cy="2681787"/>
+            <a:off x="2139793" y="3022626"/>
+            <a:ext cx="2082884" cy="2746547"/>
           </a:xfrm>
           <a:prstGeom prst="line">
             <a:avLst/>
@@ -9129,7 +11657,7 @@
         </p:nvSpPr>
         <p:spPr>
           <a:xfrm>
-            <a:off x="4189463" y="2846725"/>
+            <a:off x="4189463" y="2854963"/>
             <a:ext cx="1124821" cy="707886"/>
           </a:xfrm>
           <a:prstGeom prst="rect">
@@ -10120,9 +12648,9 @@
           <p:nvPr/>
         </p:nvSpPr>
         <p:spPr>
-          <a:xfrm rot="18903025">
-            <a:off x="101991" y="4052624"/>
-            <a:ext cx="4726849" cy="983374"/>
+          <a:xfrm rot="18928435">
+            <a:off x="12561" y="4062968"/>
+            <a:ext cx="4807137" cy="852753"/>
           </a:xfrm>
           <a:prstGeom prst="arc">
             <a:avLst>
@@ -10923,8 +13451,8 @@
             </p:nvSpPr>
             <p:spPr>
               <a:xfrm>
-                <a:off x="-57607" y="815629"/>
-                <a:ext cx="5647217" cy="1569660"/>
+                <a:off x="0" y="815629"/>
+                <a:ext cx="5589610" cy="1569660"/>
               </a:xfrm>
               <a:prstGeom prst="rect">
                 <a:avLst/>
@@ -10998,8 +13526,8 @@
             </p:nvSpPr>
             <p:spPr>
               <a:xfrm>
-                <a:off x="-57607" y="815629"/>
-                <a:ext cx="5647217" cy="1569660"/>
+                <a:off x="0" y="815629"/>
+                <a:ext cx="5589610" cy="1569660"/>
               </a:xfrm>
               <a:prstGeom prst="rect">
                 <a:avLst/>
@@ -11007,7 +13535,7 @@
               <a:blipFill rotWithShape="0">
                 <a:blip r:embed="rId8"/>
                 <a:stretch>
-                  <a:fillRect l="-864" t="-3113" r="-1944"/>
+                  <a:fillRect l="-1200" t="-3113" r="-2617"/>
                 </a:stretch>
               </a:blipFill>
             </p:spPr>
@@ -11194,7 +13722,7 @@
         </p:nvSpPr>
         <p:spPr>
           <a:xfrm>
-            <a:off x="2924267" y="4218569"/>
+            <a:off x="2924267" y="4267773"/>
             <a:ext cx="1124821" cy="400110"/>
           </a:xfrm>
           <a:prstGeom prst="rect">
@@ -11309,76 +13837,232 @@
           </a:fontRef>
         </p:style>
       </p:cxnSp>
-      <p:sp>
-        <p:nvSpPr>
-          <p:cNvPr id="60" name="TextBox 59"/>
-          <p:cNvSpPr txBox="1"/>
-          <p:nvPr/>
-        </p:nvSpPr>
-        <p:spPr>
-          <a:xfrm>
-            <a:off x="3766408" y="5027001"/>
-            <a:ext cx="1578979" cy="400110"/>
-          </a:xfrm>
-          <a:prstGeom prst="rect">
-            <a:avLst/>
-          </a:prstGeom>
-          <a:noFill/>
-          <a:ln>
-            <a:solidFill>
-              <a:srgbClr val="FF0000"/>
-            </a:solidFill>
-          </a:ln>
-        </p:spPr>
-        <p:txBody>
-          <a:bodyPr wrap="square" rtlCol="0">
-            <a:spAutoFit/>
-          </a:bodyPr>
-          <a:lstStyle/>
-          <a:p>
-            <a:pPr algn="ctr"/>
-            <a:r>
-              <a:rPr lang="en-GB" sz="2000" dirty="0" smtClean="0">
-                <a:latin typeface="Times New Roman" panose="02020603050405020304" pitchFamily="18" charset="0"/>
-                <a:cs typeface="Times New Roman" panose="02020603050405020304" pitchFamily="18" charset="0"/>
-              </a:rPr>
-              <a:t>R</a:t>
-            </a:r>
-            <a:r>
-              <a:rPr lang="en-GB" sz="2000" baseline="-25000" dirty="0" smtClean="0">
-                <a:latin typeface="Times New Roman" panose="02020603050405020304" pitchFamily="18" charset="0"/>
-                <a:cs typeface="Times New Roman" panose="02020603050405020304" pitchFamily="18" charset="0"/>
-              </a:rPr>
-              <a:t>obs </a:t>
-            </a:r>
-            <a:r>
-              <a:rPr lang="en-GB" sz="2000" dirty="0" smtClean="0">
-                <a:latin typeface="Times New Roman" panose="02020603050405020304" pitchFamily="18" charset="0"/>
-                <a:cs typeface="Times New Roman" panose="02020603050405020304" pitchFamily="18" charset="0"/>
-              </a:rPr>
-              <a:t>&gt; </a:t>
-            </a:r>
-            <a:r>
-              <a:rPr lang="en-GB" sz="2000" dirty="0" err="1" smtClean="0">
-                <a:latin typeface="Times New Roman" panose="02020603050405020304" pitchFamily="18" charset="0"/>
-                <a:cs typeface="Times New Roman" panose="02020603050405020304" pitchFamily="18" charset="0"/>
-              </a:rPr>
-              <a:t>R</a:t>
-            </a:r>
-            <a:r>
-              <a:rPr lang="en-GB" sz="2000" baseline="-25000" dirty="0" err="1" smtClean="0">
-                <a:latin typeface="Times New Roman" panose="02020603050405020304" pitchFamily="18" charset="0"/>
-                <a:cs typeface="Times New Roman" panose="02020603050405020304" pitchFamily="18" charset="0"/>
-              </a:rPr>
-              <a:t>ref</a:t>
-            </a:r>
-            <a:endParaRPr lang="en-GB" sz="2000" dirty="0">
-              <a:latin typeface="Times New Roman" panose="02020603050405020304" pitchFamily="18" charset="0"/>
-              <a:cs typeface="Times New Roman" panose="02020603050405020304" pitchFamily="18" charset="0"/>
-            </a:endParaRPr>
-          </a:p>
-        </p:txBody>
-      </p:sp>
+      <mc:AlternateContent xmlns:mc="http://schemas.openxmlformats.org/markup-compatibility/2006" xmlns:a14="http://schemas.microsoft.com/office/drawing/2010/main">
+        <mc:Choice Requires="a14">
+          <p:sp>
+            <p:nvSpPr>
+              <p:cNvPr id="60" name="TextBox 59"/>
+              <p:cNvSpPr txBox="1"/>
+              <p:nvPr/>
+            </p:nvSpPr>
+            <p:spPr>
+              <a:xfrm>
+                <a:off x="3766408" y="5027001"/>
+                <a:ext cx="1863701" cy="685572"/>
+              </a:xfrm>
+              <a:prstGeom prst="rect">
+                <a:avLst/>
+              </a:prstGeom>
+              <a:noFill/>
+              <a:ln>
+                <a:solidFill>
+                  <a:srgbClr val="FF0000"/>
+                </a:solidFill>
+              </a:ln>
+            </p:spPr>
+            <p:txBody>
+              <a:bodyPr wrap="square" rtlCol="0">
+                <a:spAutoFit/>
+              </a:bodyPr>
+              <a:lstStyle/>
+              <a:p>
+                <a:pPr algn="ctr"/>
+                <a14:m>
+                  <m:oMathPara xmlns:m="http://schemas.openxmlformats.org/officeDocument/2006/math">
+                    <m:oMathParaPr>
+                      <m:jc m:val="centerGroup"/>
+                    </m:oMathParaPr>
+                    <m:oMath xmlns:m="http://schemas.openxmlformats.org/officeDocument/2006/math">
+                      <m:f>
+                        <m:fPr>
+                          <m:ctrlPr>
+                            <a:rPr lang="en-GB" sz="2000" i="1" smtClean="0">
+                              <a:latin typeface="Cambria Math" panose="02040503050406030204" pitchFamily="18" charset="0"/>
+                              <a:cs typeface="Times New Roman" panose="02020603050405020304" pitchFamily="18" charset="0"/>
+                            </a:rPr>
+                          </m:ctrlPr>
+                        </m:fPr>
+                        <m:num>
+                          <m:r>
+                            <a:rPr lang="en-GB" sz="2000" i="1" smtClean="0">
+                              <a:latin typeface="Cambria Math" panose="02040503050406030204" pitchFamily="18" charset="0"/>
+                              <a:cs typeface="Times New Roman" panose="02020603050405020304" pitchFamily="18" charset="0"/>
+                            </a:rPr>
+                            <m:t>𝑑</m:t>
+                          </m:r>
+                          <m:sSub>
+                            <m:sSubPr>
+                              <m:ctrlPr>
+                                <a:rPr lang="en-GB" sz="2000" i="1" smtClean="0">
+                                  <a:latin typeface="Cambria Math" panose="02040503050406030204" pitchFamily="18" charset="0"/>
+                                  <a:cs typeface="Times New Roman" panose="02020603050405020304" pitchFamily="18" charset="0"/>
+                                </a:rPr>
+                              </m:ctrlPr>
+                            </m:sSubPr>
+                            <m:e>
+                              <m:r>
+                                <a:rPr lang="en-GB" sz="2000" b="0" i="1" smtClean="0">
+                                  <a:latin typeface="Cambria Math" panose="02040503050406030204" pitchFamily="18" charset="0"/>
+                                  <a:cs typeface="Times New Roman" panose="02020603050405020304" pitchFamily="18" charset="0"/>
+                                </a:rPr>
+                                <m:t>𝑅</m:t>
+                              </m:r>
+                            </m:e>
+                            <m:sub>
+                              <m:r>
+                                <a:rPr lang="en-GB" sz="2000" b="0" i="1" smtClean="0">
+                                  <a:latin typeface="Cambria Math" panose="02040503050406030204" pitchFamily="18" charset="0"/>
+                                  <a:cs typeface="Times New Roman" panose="02020603050405020304" pitchFamily="18" charset="0"/>
+                                </a:rPr>
+                                <m:t>𝑜𝑏𝑠</m:t>
+                              </m:r>
+                            </m:sub>
+                          </m:sSub>
+                        </m:num>
+                        <m:den>
+                          <m:r>
+                            <a:rPr lang="en-GB" sz="2000" i="1" smtClean="0">
+                              <a:latin typeface="Cambria Math" panose="02040503050406030204" pitchFamily="18" charset="0"/>
+                              <a:cs typeface="Times New Roman" panose="02020603050405020304" pitchFamily="18" charset="0"/>
+                            </a:rPr>
+                            <m:t>𝑑</m:t>
+                          </m:r>
+                          <m:r>
+                            <a:rPr lang="en-GB" sz="2000" i="1" smtClean="0">
+                              <a:latin typeface="Cambria Math" panose="02040503050406030204" pitchFamily="18" charset="0"/>
+                              <a:ea typeface="Cambria Math" panose="02040503050406030204" pitchFamily="18" charset="0"/>
+                              <a:cs typeface="Times New Roman" panose="02020603050405020304" pitchFamily="18" charset="0"/>
+                            </a:rPr>
+                            <m:t>𝜃</m:t>
+                          </m:r>
+                        </m:den>
+                      </m:f>
+                      <m:r>
+                        <a:rPr lang="en-GB" sz="2000" b="0" i="1" smtClean="0">
+                          <a:latin typeface="Cambria Math" panose="02040503050406030204" pitchFamily="18" charset="0"/>
+                          <a:cs typeface="Times New Roman" panose="02020603050405020304" pitchFamily="18" charset="0"/>
+                        </a:rPr>
+                        <m:t>&gt;</m:t>
+                      </m:r>
+                      <m:f>
+                        <m:fPr>
+                          <m:ctrlPr>
+                            <a:rPr lang="en-GB" sz="2000" b="0" i="1" smtClean="0">
+                              <a:latin typeface="Cambria Math" panose="02040503050406030204" pitchFamily="18" charset="0"/>
+                              <a:cs typeface="Times New Roman" panose="02020603050405020304" pitchFamily="18" charset="0"/>
+                            </a:rPr>
+                          </m:ctrlPr>
+                        </m:fPr>
+                        <m:num>
+                          <m:r>
+                            <a:rPr lang="en-GB" sz="2000" b="0" i="1" smtClean="0">
+                              <a:latin typeface="Cambria Math" panose="02040503050406030204" pitchFamily="18" charset="0"/>
+                              <a:cs typeface="Times New Roman" panose="02020603050405020304" pitchFamily="18" charset="0"/>
+                            </a:rPr>
+                            <m:t>𝑑</m:t>
+                          </m:r>
+                          <m:sSub>
+                            <m:sSubPr>
+                              <m:ctrlPr>
+                                <a:rPr lang="en-GB" sz="2000" b="0" i="1" smtClean="0">
+                                  <a:latin typeface="Cambria Math" panose="02040503050406030204" pitchFamily="18" charset="0"/>
+                                  <a:cs typeface="Times New Roman" panose="02020603050405020304" pitchFamily="18" charset="0"/>
+                                </a:rPr>
+                              </m:ctrlPr>
+                            </m:sSubPr>
+                            <m:e>
+                              <m:r>
+                                <a:rPr lang="en-GB" sz="2000" b="0" i="1" smtClean="0">
+                                  <a:latin typeface="Cambria Math" panose="02040503050406030204" pitchFamily="18" charset="0"/>
+                                  <a:cs typeface="Times New Roman" panose="02020603050405020304" pitchFamily="18" charset="0"/>
+                                </a:rPr>
+                                <m:t>𝑅</m:t>
+                              </m:r>
+                            </m:e>
+                            <m:sub>
+                              <m:r>
+                                <a:rPr lang="en-GB" sz="2000" b="0" i="1" smtClean="0">
+                                  <a:latin typeface="Cambria Math" panose="02040503050406030204" pitchFamily="18" charset="0"/>
+                                  <a:cs typeface="Times New Roman" panose="02020603050405020304" pitchFamily="18" charset="0"/>
+                                </a:rPr>
+                                <m:t>𝑟𝑒𝑓</m:t>
+                              </m:r>
+                            </m:sub>
+                          </m:sSub>
+                        </m:num>
+                        <m:den>
+                          <m:r>
+                            <a:rPr lang="en-GB" sz="2000" b="0" i="1" smtClean="0">
+                              <a:latin typeface="Cambria Math" panose="02040503050406030204" pitchFamily="18" charset="0"/>
+                              <a:cs typeface="Times New Roman" panose="02020603050405020304" pitchFamily="18" charset="0"/>
+                            </a:rPr>
+                            <m:t>𝑑</m:t>
+                          </m:r>
+                          <m:r>
+                            <a:rPr lang="en-GB" sz="2000" b="0" i="1" smtClean="0">
+                              <a:latin typeface="Cambria Math" panose="02040503050406030204" pitchFamily="18" charset="0"/>
+                              <a:ea typeface="Cambria Math" panose="02040503050406030204" pitchFamily="18" charset="0"/>
+                              <a:cs typeface="Times New Roman" panose="02020603050405020304" pitchFamily="18" charset="0"/>
+                            </a:rPr>
+                            <m:t>𝜃</m:t>
+                          </m:r>
+                        </m:den>
+                      </m:f>
+                    </m:oMath>
+                  </m:oMathPara>
+                </a14:m>
+                <a:endParaRPr lang="en-GB" sz="2000" dirty="0">
+                  <a:latin typeface="Times New Roman" panose="02020603050405020304" pitchFamily="18" charset="0"/>
+                  <a:cs typeface="Times New Roman" panose="02020603050405020304" pitchFamily="18" charset="0"/>
+                </a:endParaRPr>
+              </a:p>
+            </p:txBody>
+          </p:sp>
+        </mc:Choice>
+        <mc:Fallback xmlns="">
+          <p:sp>
+            <p:nvSpPr>
+              <p:cNvPr id="60" name="TextBox 59"/>
+              <p:cNvSpPr txBox="1">
+                <a:spLocks noRot="1" noChangeAspect="1" noMove="1" noResize="1" noEditPoints="1" noAdjustHandles="1" noChangeArrowheads="1" noChangeShapeType="1" noTextEdit="1"/>
+              </p:cNvSpPr>
+              <p:nvPr/>
+            </p:nvSpPr>
+            <p:spPr>
+              <a:xfrm>
+                <a:off x="3766408" y="5027001"/>
+                <a:ext cx="1863701" cy="685572"/>
+              </a:xfrm>
+              <a:prstGeom prst="rect">
+                <a:avLst/>
+              </a:prstGeom>
+              <a:blipFill rotWithShape="0">
+                <a:blip r:embed="rId10"/>
+                <a:stretch>
+                  <a:fillRect/>
+                </a:stretch>
+              </a:blipFill>
+              <a:ln>
+                <a:solidFill>
+                  <a:srgbClr val="FF0000"/>
+                </a:solidFill>
+              </a:ln>
+            </p:spPr>
+            <p:txBody>
+              <a:bodyPr/>
+              <a:lstStyle/>
+              <a:p>
+                <a:r>
+                  <a:rPr lang="en-GB">
+                    <a:noFill/>
+                  </a:rPr>
+                  <a:t> </a:t>
+                </a:r>
+              </a:p>
+            </p:txBody>
+          </p:sp>
+        </mc:Fallback>
+      </mc:AlternateContent>
       <p:sp>
         <p:nvSpPr>
           <p:cNvPr id="16" name="TextBox 15"/>
@@ -11387,7 +14071,7 @@
         </p:nvSpPr>
         <p:spPr>
           <a:xfrm>
-            <a:off x="3836272" y="2397193"/>
+            <a:off x="3868978" y="2334363"/>
             <a:ext cx="1191027" cy="923330"/>
           </a:xfrm>
           <a:prstGeom prst="rect">
@@ -12858,6 +15542,36 @@
           <a:chExt cx="0" cy="0"/>
         </a:xfrm>
       </p:grpSpPr>
+      <p:pic>
+        <p:nvPicPr>
+          <p:cNvPr id="3" name="Picture 2"/>
+          <p:cNvPicPr>
+            <a:picLocks noChangeAspect="1"/>
+          </p:cNvPicPr>
+          <p:nvPr/>
+        </p:nvPicPr>
+        <p:blipFill>
+          <a:blip r:embed="rId2">
+            <a:extLst>
+              <a:ext uri="{28A0092B-C50C-407E-A947-70E740481C1C}">
+                <a14:useLocalDpi xmlns:a14="http://schemas.microsoft.com/office/drawing/2010/main" val="0"/>
+              </a:ext>
+            </a:extLst>
+          </a:blip>
+          <a:stretch>
+            <a:fillRect/>
+          </a:stretch>
+        </p:blipFill>
+        <p:spPr>
+          <a:xfrm>
+            <a:off x="5766486" y="1132870"/>
+            <a:ext cx="6343136" cy="4821219"/>
+          </a:xfrm>
+          <a:prstGeom prst="rect">
+            <a:avLst/>
+          </a:prstGeom>
+        </p:spPr>
+      </p:pic>
       <p:sp>
         <p:nvSpPr>
           <p:cNvPr id="4" name="Title 1"/>
@@ -12915,35 +15629,6 @@
           </a:p>
         </p:txBody>
       </p:sp>
-      <p:pic>
-        <p:nvPicPr>
-          <p:cNvPr id="13" name="Picture 12"/>
-          <p:cNvPicPr>
-            <a:picLocks noChangeAspect="1"/>
-          </p:cNvPicPr>
-          <p:nvPr/>
-        </p:nvPicPr>
-        <p:blipFill rotWithShape="1">
-          <a:blip r:embed="rId2">
-            <a:extLst>
-              <a:ext uri="{28A0092B-C50C-407E-A947-70E740481C1C}">
-                <a14:useLocalDpi xmlns:a14="http://schemas.microsoft.com/office/drawing/2010/main" val="0"/>
-              </a:ext>
-            </a:extLst>
-          </a:blip>
-          <a:srcRect l="1701" t="441" r="4112" b="1013"/>
-          <a:stretch/>
-        </p:blipFill>
-        <p:spPr>
-          <a:xfrm>
-            <a:off x="5766487" y="1081087"/>
-            <a:ext cx="6343135" cy="4883238"/>
-          </a:xfrm>
-          <a:prstGeom prst="rect">
-            <a:avLst/>
-          </a:prstGeom>
-        </p:spPr>
-      </p:pic>
       <mc:AlternateContent xmlns:mc="http://schemas.openxmlformats.org/markup-compatibility/2006" xmlns:a14="http://schemas.microsoft.com/office/drawing/2010/main">
         <mc:Choice Requires="a14">
           <p:sp>
@@ -12954,7 +15639,7 @@
             </p:nvSpPr>
             <p:spPr>
               <a:xfrm>
-                <a:off x="32952" y="1089325"/>
+                <a:off x="32952" y="1132870"/>
                 <a:ext cx="5647217" cy="4154984"/>
               </a:xfrm>
               <a:prstGeom prst="rect">
@@ -13109,7 +15794,7 @@
             </p:nvSpPr>
             <p:spPr>
               <a:xfrm>
-                <a:off x="32952" y="1089325"/>
+                <a:off x="32952" y="1132870"/>
                 <a:ext cx="5647217" cy="4154984"/>
               </a:xfrm>
               <a:prstGeom prst="rect">
@@ -13147,7 +15832,7 @@
             </p:nvSpPr>
             <p:spPr>
               <a:xfrm>
-                <a:off x="32952" y="6145561"/>
+                <a:off x="32952" y="6110727"/>
                 <a:ext cx="12076669" cy="400110"/>
               </a:xfrm>
               <a:prstGeom prst="rect">
@@ -13240,7 +15925,7 @@
             </p:nvSpPr>
             <p:spPr>
               <a:xfrm>
-                <a:off x="32952" y="6145561"/>
+                <a:off x="32952" y="6110727"/>
                 <a:ext cx="12076669" cy="400110"/>
               </a:xfrm>
               <a:prstGeom prst="rect">
@@ -13278,7 +15963,7 @@
             </p:nvSpPr>
             <p:spPr>
               <a:xfrm>
-                <a:off x="5766486" y="1089325"/>
+                <a:off x="5766486" y="1141579"/>
                 <a:ext cx="6343134" cy="400110"/>
               </a:xfrm>
               <a:prstGeom prst="rect">
@@ -13397,7 +16082,7 @@
             </p:nvSpPr>
             <p:spPr>
               <a:xfrm>
-                <a:off x="5766486" y="1089325"/>
+                <a:off x="5766486" y="1141579"/>
                 <a:ext cx="6343134" cy="400110"/>
               </a:xfrm>
               <a:prstGeom prst="rect">
@@ -13406,7 +16091,7 @@
               <a:blipFill rotWithShape="0">
                 <a:blip r:embed="rId5"/>
                 <a:stretch>
-                  <a:fillRect t="-9231" b="-27692"/>
+                  <a:fillRect t="-7576" b="-25758"/>
                 </a:stretch>
               </a:blipFill>
             </p:spPr>
@@ -13556,7 +16241,7 @@
                                 </p:cTn>
                               </p:par>
                               <p:par>
-                                <p:cTn id="13" presetID="10" presetClass="entr" presetSubtype="0" fill="hold" nodeType="withEffect">
+                                <p:cTn id="13" presetID="10" presetClass="entr" presetSubtype="0" fill="hold" grpId="0" nodeType="withEffect">
                                   <p:stCondLst>
                                     <p:cond delay="0"/>
                                   </p:stCondLst>
@@ -13564,41 +16249,6 @@
                                     <p:set>
                                       <p:cBhvr>
                                         <p:cTn id="14" dur="1" fill="hold">
-                                          <p:stCondLst>
-                                            <p:cond delay="0"/>
-                                          </p:stCondLst>
-                                        </p:cTn>
-                                        <p:tgtEl>
-                                          <p:spTgt spid="13"/>
-                                        </p:tgtEl>
-                                        <p:attrNameLst>
-                                          <p:attrName>style.visibility</p:attrName>
-                                        </p:attrNameLst>
-                                      </p:cBhvr>
-                                      <p:to>
-                                        <p:strVal val="visible"/>
-                                      </p:to>
-                                    </p:set>
-                                    <p:animEffect transition="in" filter="fade">
-                                      <p:cBhvr>
-                                        <p:cTn id="15" dur="500"/>
-                                        <p:tgtEl>
-                                          <p:spTgt spid="13"/>
-                                        </p:tgtEl>
-                                      </p:cBhvr>
-                                    </p:animEffect>
-                                  </p:childTnLst>
-                                </p:cTn>
-                              </p:par>
-                              <p:par>
-                                <p:cTn id="16" presetID="10" presetClass="entr" presetSubtype="0" fill="hold" grpId="0" nodeType="withEffect">
-                                  <p:stCondLst>
-                                    <p:cond delay="0"/>
-                                  </p:stCondLst>
-                                  <p:childTnLst>
-                                    <p:set>
-                                      <p:cBhvr>
-                                        <p:cTn id="17" dur="1" fill="hold">
                                           <p:stCondLst>
                                             <p:cond delay="0"/>
                                           </p:stCondLst>
@@ -13616,9 +16266,44 @@
                                     </p:set>
                                     <p:animEffect transition="in" filter="fade">
                                       <p:cBhvr>
+                                        <p:cTn id="15" dur="500"/>
+                                        <p:tgtEl>
+                                          <p:spTgt spid="17"/>
+                                        </p:tgtEl>
+                                      </p:cBhvr>
+                                    </p:animEffect>
+                                  </p:childTnLst>
+                                </p:cTn>
+                              </p:par>
+                              <p:par>
+                                <p:cTn id="16" presetID="10" presetClass="entr" presetSubtype="0" fill="hold" nodeType="withEffect">
+                                  <p:stCondLst>
+                                    <p:cond delay="0"/>
+                                  </p:stCondLst>
+                                  <p:childTnLst>
+                                    <p:set>
+                                      <p:cBhvr>
+                                        <p:cTn id="17" dur="1" fill="hold">
+                                          <p:stCondLst>
+                                            <p:cond delay="0"/>
+                                          </p:stCondLst>
+                                        </p:cTn>
+                                        <p:tgtEl>
+                                          <p:spTgt spid="3"/>
+                                        </p:tgtEl>
+                                        <p:attrNameLst>
+                                          <p:attrName>style.visibility</p:attrName>
+                                        </p:attrNameLst>
+                                      </p:cBhvr>
+                                      <p:to>
+                                        <p:strVal val="visible"/>
+                                      </p:to>
+                                    </p:set>
+                                    <p:animEffect transition="in" filter="fade">
+                                      <p:cBhvr>
                                         <p:cTn id="18" dur="500"/>
                                         <p:tgtEl>
-                                          <p:spTgt spid="17"/>
+                                          <p:spTgt spid="3"/>
                                         </p:tgtEl>
                                       </p:cBhvr>
                                     </p:animEffect>
@@ -13732,6 +16417,64 @@
           <a:chExt cx="0" cy="0"/>
         </a:xfrm>
       </p:grpSpPr>
+      <p:pic>
+        <p:nvPicPr>
+          <p:cNvPr id="10" name="Picture 9"/>
+          <p:cNvPicPr>
+            <a:picLocks noChangeAspect="1"/>
+          </p:cNvPicPr>
+          <p:nvPr/>
+        </p:nvPicPr>
+        <p:blipFill rotWithShape="1">
+          <a:blip r:embed="rId2">
+            <a:extLst>
+              <a:ext uri="{28A0092B-C50C-407E-A947-70E740481C1C}">
+                <a14:useLocalDpi xmlns:a14="http://schemas.microsoft.com/office/drawing/2010/main" val="0"/>
+              </a:ext>
+            </a:extLst>
+          </a:blip>
+          <a:srcRect t="1" r="1196" b="1049"/>
+          <a:stretch/>
+        </p:blipFill>
+        <p:spPr>
+          <a:xfrm>
+            <a:off x="6092859" y="976817"/>
+            <a:ext cx="5914168" cy="4487998"/>
+          </a:xfrm>
+          <a:prstGeom prst="rect">
+            <a:avLst/>
+          </a:prstGeom>
+        </p:spPr>
+      </p:pic>
+      <p:pic>
+        <p:nvPicPr>
+          <p:cNvPr id="7" name="Picture 6"/>
+          <p:cNvPicPr>
+            <a:picLocks noChangeAspect="1"/>
+          </p:cNvPicPr>
+          <p:nvPr/>
+        </p:nvPicPr>
+        <p:blipFill rotWithShape="1">
+          <a:blip r:embed="rId3">
+            <a:extLst>
+              <a:ext uri="{28A0092B-C50C-407E-A947-70E740481C1C}">
+                <a14:useLocalDpi xmlns:a14="http://schemas.microsoft.com/office/drawing/2010/main" val="0"/>
+              </a:ext>
+            </a:extLst>
+          </a:blip>
+          <a:srcRect t="-106"/>
+          <a:stretch/>
+        </p:blipFill>
+        <p:spPr>
+          <a:xfrm>
+            <a:off x="107543" y="976818"/>
+            <a:ext cx="5913197" cy="4485728"/>
+          </a:xfrm>
+          <a:prstGeom prst="rect">
+            <a:avLst/>
+          </a:prstGeom>
+        </p:spPr>
+      </p:pic>
       <p:sp>
         <p:nvSpPr>
           <p:cNvPr id="15" name="Title 1"/>
@@ -13789,66 +16532,8 @@
           </a:p>
         </p:txBody>
       </p:sp>
-      <p:pic>
-        <p:nvPicPr>
-          <p:cNvPr id="6" name="Picture 5"/>
-          <p:cNvPicPr>
-            <a:picLocks noChangeAspect="1"/>
-          </p:cNvPicPr>
-          <p:nvPr/>
-        </p:nvPicPr>
-        <p:blipFill rotWithShape="1">
-          <a:blip r:embed="rId2">
-            <a:extLst>
-              <a:ext uri="{28A0092B-C50C-407E-A947-70E740481C1C}">
-                <a14:useLocalDpi xmlns:a14="http://schemas.microsoft.com/office/drawing/2010/main" val="0"/>
-              </a:ext>
-            </a:extLst>
-          </a:blip>
-          <a:srcRect r="2063"/>
-          <a:stretch/>
-        </p:blipFill>
-        <p:spPr>
-          <a:xfrm>
-            <a:off x="107542" y="932339"/>
-            <a:ext cx="5864890" cy="4317746"/>
-          </a:xfrm>
-          <a:prstGeom prst="rect">
-            <a:avLst/>
-          </a:prstGeom>
-        </p:spPr>
-      </p:pic>
-      <p:pic>
-        <p:nvPicPr>
-          <p:cNvPr id="7" name="Picture 6"/>
-          <p:cNvPicPr>
-            <a:picLocks noChangeAspect="1"/>
-          </p:cNvPicPr>
-          <p:nvPr/>
-        </p:nvPicPr>
-        <p:blipFill rotWithShape="1">
-          <a:blip r:embed="rId3">
-            <a:extLst>
-              <a:ext uri="{28A0092B-C50C-407E-A947-70E740481C1C}">
-                <a14:useLocalDpi xmlns:a14="http://schemas.microsoft.com/office/drawing/2010/main" val="0"/>
-              </a:ext>
-            </a:extLst>
-          </a:blip>
-          <a:srcRect t="1435" r="2531"/>
-          <a:stretch/>
-        </p:blipFill>
-        <p:spPr>
-          <a:xfrm>
-            <a:off x="6087762" y="930875"/>
-            <a:ext cx="5988908" cy="4319210"/>
-          </a:xfrm>
-          <a:prstGeom prst="rect">
-            <a:avLst/>
-          </a:prstGeom>
-        </p:spPr>
-      </p:pic>
-      <mc:AlternateContent xmlns:mc="http://schemas.openxmlformats.org/markup-compatibility/2006" xmlns:a14="http://schemas.microsoft.com/office/drawing/2010/main">
-        <mc:Choice Requires="a14">
+      <mc:AlternateContent xmlns:mc="http://schemas.openxmlformats.org/markup-compatibility/2006">
+        <mc:Choice xmlns:a14="http://schemas.microsoft.com/office/drawing/2010/main" Requires="a14">
           <p:sp>
             <p:nvSpPr>
               <p:cNvPr id="8" name="TextBox 7"/>
@@ -13857,7 +16542,7 @@
             </p:nvSpPr>
             <p:spPr>
               <a:xfrm>
-                <a:off x="2108884" y="1087397"/>
+                <a:off x="1942435" y="921160"/>
                 <a:ext cx="2454876" cy="369332"/>
               </a:xfrm>
               <a:prstGeom prst="rect">
@@ -13952,7 +16637,7 @@
             </p:txBody>
           </p:sp>
         </mc:Choice>
-        <mc:Fallback xmlns="">
+        <mc:Fallback>
           <p:sp>
             <p:nvSpPr>
               <p:cNvPr id="8" name="TextBox 7"/>
@@ -13963,7 +16648,7 @@
             </p:nvSpPr>
             <p:spPr>
               <a:xfrm>
-                <a:off x="2108884" y="1087397"/>
+                <a:off x="1942435" y="921160"/>
                 <a:ext cx="2454876" cy="369332"/>
               </a:xfrm>
               <a:prstGeom prst="rect">
@@ -13972,7 +16657,7 @@
               <a:blipFill rotWithShape="0">
                 <a:blip r:embed="rId4"/>
                 <a:stretch>
-                  <a:fillRect t="-8197" r="-1241" b="-24590"/>
+                  <a:fillRect t="-8197" r="-1493" b="-24590"/>
                 </a:stretch>
               </a:blipFill>
             </p:spPr>
@@ -13991,8 +16676,8 @@
           </p:sp>
         </mc:Fallback>
       </mc:AlternateContent>
-      <mc:AlternateContent xmlns:mc="http://schemas.openxmlformats.org/markup-compatibility/2006" xmlns:a14="http://schemas.microsoft.com/office/drawing/2010/main">
-        <mc:Choice Requires="a14">
+      <mc:AlternateContent xmlns:mc="http://schemas.openxmlformats.org/markup-compatibility/2006">
+        <mc:Choice xmlns:a14="http://schemas.microsoft.com/office/drawing/2010/main" Requires="a14">
           <p:sp>
             <p:nvSpPr>
               <p:cNvPr id="16" name="TextBox 15"/>
@@ -14001,7 +16686,7 @@
             </p:nvSpPr>
             <p:spPr>
               <a:xfrm>
-                <a:off x="8176049" y="1087397"/>
+                <a:off x="7970768" y="921160"/>
                 <a:ext cx="2458995" cy="369332"/>
               </a:xfrm>
               <a:prstGeom prst="rect">
@@ -14107,7 +16792,7 @@
             </p:txBody>
           </p:sp>
         </mc:Choice>
-        <mc:Fallback xmlns="">
+        <mc:Fallback>
           <p:sp>
             <p:nvSpPr>
               <p:cNvPr id="16" name="TextBox 15"/>
@@ -14118,7 +16803,7 @@
             </p:nvSpPr>
             <p:spPr>
               <a:xfrm>
-                <a:off x="8176049" y="1087397"/>
+                <a:off x="7970768" y="921160"/>
                 <a:ext cx="2458995" cy="369332"/>
               </a:xfrm>
               <a:prstGeom prst="rect">
@@ -14416,7 +17101,7 @@
                                           </p:stCondLst>
                                         </p:cTn>
                                         <p:tgtEl>
-                                          <p:spTgt spid="6"/>
+                                          <p:spTgt spid="7"/>
                                         </p:tgtEl>
                                         <p:attrNameLst>
                                           <p:attrName>style.visibility</p:attrName>
@@ -14430,7 +17115,7 @@
                                       <p:cBhvr>
                                         <p:cTn id="12" dur="500"/>
                                         <p:tgtEl>
-                                          <p:spTgt spid="6"/>
+                                          <p:spTgt spid="7"/>
                                         </p:tgtEl>
                                       </p:cBhvr>
                                     </p:animEffect>
@@ -14521,7 +17206,7 @@
                                           </p:stCondLst>
                                         </p:cTn>
                                         <p:tgtEl>
-                                          <p:spTgt spid="7"/>
+                                          <p:spTgt spid="10"/>
                                         </p:tgtEl>
                                         <p:attrNameLst>
                                           <p:attrName>style.visibility</p:attrName>
@@ -14535,7 +17220,7 @@
                                       <p:cBhvr>
                                         <p:cTn id="21" dur="500"/>
                                         <p:tgtEl>
-                                          <p:spTgt spid="7"/>
+                                          <p:spTgt spid="10"/>
                                         </p:tgtEl>
                                       </p:cBhvr>
                                     </p:animEffect>

</xml_diff>